<commit_message>
1 level dfd added
</commit_message>
<xml_diff>
--- a/report/diagrams/DFD_FileManagement.pptx
+++ b/report/diagrams/DFD_FileManagement.pptx
@@ -109,7 +109,7 @@
   </p:defaultTextStyle>
   <p:extLst>
     <p:ext uri="{EFAFB233-063F-42B5-8137-9DF3F51BA10A}">
-      <p15:sldGuideLst xmlns:p15="http://schemas.microsoft.com/office/powerpoint/2012/main">
+      <p15:sldGuideLst xmlns="" xmlns:p15="http://schemas.microsoft.com/office/powerpoint/2012/main">
         <p15:guide id="1" orient="horz" pos="2160">
           <p15:clr>
             <a:srgbClr val="A4A3A4"/>
@@ -3592,11 +3592,7 @@
           <a:p>
             <a:r>
               <a:rPr lang="en-US" dirty="0" smtClean="0"/>
-              <a:t>File </a:t>
-            </a:r>
-            <a:r>
-              <a:rPr lang="en-US" dirty="0" smtClean="0"/>
-              <a:t>Info </a:t>
+              <a:t>File Info </a:t>
             </a:r>
           </a:p>
           <a:p>
@@ -3610,7 +3606,6 @@
               <a:rPr lang="en-US" dirty="0" smtClean="0"/>
               <a:t>device details</a:t>
             </a:r>
-            <a:endParaRPr lang="en-US" dirty="0" smtClean="0"/>
           </a:p>
         </p:txBody>
       </p:sp>
@@ -3686,17 +3681,8 @@
           <a:p>
             <a:r>
               <a:rPr lang="en-US" dirty="0" smtClean="0"/>
-              <a:t>File details </a:t>
-            </a:r>
-            <a:r>
-              <a:rPr lang="en-US" dirty="0" smtClean="0"/>
-              <a:t>and </a:t>
-            </a:r>
-            <a:r>
-              <a:rPr lang="en-US" dirty="0" err="1" smtClean="0"/>
-              <a:t>info,Access</a:t>
-            </a:r>
-            <a:endParaRPr lang="en-US" dirty="0" smtClean="0"/>
+              <a:t>File details and info, Access</a:t>
+            </a:r>
           </a:p>
           <a:p>
             <a:r>
@@ -3803,11 +3789,7 @@
           <a:p>
             <a:r>
               <a:rPr lang="en-US" dirty="0" smtClean="0"/>
-              <a:t>Device </a:t>
-            </a:r>
-            <a:r>
-              <a:rPr lang="en-US" dirty="0" smtClean="0"/>
-              <a:t>info, </a:t>
+              <a:t>Device info, </a:t>
             </a:r>
           </a:p>
           <a:p>
@@ -3815,7 +3797,6 @@
               <a:rPr lang="en-US" dirty="0" smtClean="0"/>
               <a:t>File details </a:t>
             </a:r>
-            <a:endParaRPr lang="en-US" dirty="0" smtClean="0"/>
           </a:p>
           <a:p>
             <a:r>
@@ -3844,6 +3825,9 @@
             <a:avLst/>
           </a:prstGeom>
           <a:ln>
+            <a:solidFill>
+              <a:schemeClr val="tx1"/>
+            </a:solidFill>
             <a:tailEnd type="triangle"/>
           </a:ln>
         </p:spPr>
@@ -3880,6 +3864,9 @@
             <a:avLst/>
           </a:prstGeom>
           <a:ln>
+            <a:solidFill>
+              <a:schemeClr val="tx1"/>
+            </a:solidFill>
             <a:tailEnd type="triangle"/>
           </a:ln>
         </p:spPr>
@@ -4029,7 +4016,7 @@
         </p:nvSpPr>
         <p:spPr>
           <a:xfrm>
-            <a:off x="746939" y="4870901"/>
+            <a:off x="683568" y="4725144"/>
             <a:ext cx="1165768" cy="800219"/>
           </a:xfrm>
           <a:prstGeom prst="rect">
@@ -4114,236 +4101,16 @@
       </p:sp>
       <p:grpSp>
         <p:nvGrpSpPr>
-          <p:cNvPr id="133" name="Group 132"/>
+          <p:cNvPr id="134" name="Group 133"/>
           <p:cNvGrpSpPr/>
           <p:nvPr/>
         </p:nvGrpSpPr>
         <p:grpSpPr>
           <a:xfrm>
-            <a:off x="3707904" y="4869160"/>
+            <a:off x="6228184" y="4653136"/>
             <a:ext cx="1728192" cy="1152128"/>
-            <a:chOff x="3851920" y="5445224"/>
+            <a:chOff x="6804248" y="4221088"/>
             <a:chExt cx="1728192" cy="1152128"/>
-          </a:xfrm>
-        </p:grpSpPr>
-        <p:sp>
-          <p:nvSpPr>
-            <p:cNvPr id="78" name="TextBox 77"/>
-            <p:cNvSpPr txBox="1"/>
-            <p:nvPr/>
-          </p:nvSpPr>
-          <p:spPr>
-            <a:xfrm>
-              <a:off x="4203323" y="5661248"/>
-              <a:ext cx="1165768" cy="800219"/>
-            </a:xfrm>
-            <a:prstGeom prst="rect">
-              <a:avLst/>
-            </a:prstGeom>
-            <a:noFill/>
-          </p:spPr>
-          <p:txBody>
-            <a:bodyPr wrap="none" rtlCol="0">
-              <a:spAutoFit/>
-            </a:bodyPr>
-            <a:lstStyle/>
-            <a:p>
-              <a:pPr algn="ctr"/>
-              <a:r>
-                <a:rPr lang="en-US" dirty="0" smtClean="0"/>
-                <a:t>5</a:t>
-              </a:r>
-            </a:p>
-            <a:p>
-              <a:pPr algn="ctr"/>
-              <a:r>
-                <a:rPr lang="en-US" sz="1400" dirty="0" smtClean="0"/>
-                <a:t>Admin</a:t>
-              </a:r>
-            </a:p>
-            <a:p>
-              <a:pPr algn="ctr"/>
-              <a:r>
-                <a:rPr lang="en-US" sz="1400" dirty="0" smtClean="0"/>
-                <a:t>Management</a:t>
-              </a:r>
-              <a:endParaRPr lang="en-IN" sz="1400" dirty="0"/>
-            </a:p>
-          </p:txBody>
-        </p:sp>
-        <p:sp>
-          <p:nvSpPr>
-            <p:cNvPr id="46" name="Oval 45"/>
-            <p:cNvSpPr/>
-            <p:nvPr/>
-          </p:nvSpPr>
-          <p:spPr>
-            <a:xfrm>
-              <a:off x="3851920" y="5445224"/>
-              <a:ext cx="1728192" cy="1152128"/>
-            </a:xfrm>
-            <a:prstGeom prst="ellipse">
-              <a:avLst/>
-            </a:prstGeom>
-            <a:noFill/>
-            <a:ln>
-              <a:solidFill>
-                <a:schemeClr val="tx1"/>
-              </a:solidFill>
-            </a:ln>
-          </p:spPr>
-          <p:style>
-            <a:lnRef idx="2">
-              <a:schemeClr val="accent1">
-                <a:shade val="50000"/>
-              </a:schemeClr>
-            </a:lnRef>
-            <a:fillRef idx="1">
-              <a:schemeClr val="accent1"/>
-            </a:fillRef>
-            <a:effectRef idx="0">
-              <a:schemeClr val="accent1"/>
-            </a:effectRef>
-            <a:fontRef idx="minor">
-              <a:schemeClr val="lt1"/>
-            </a:fontRef>
-          </p:style>
-          <p:txBody>
-            <a:bodyPr rtlCol="0" anchor="ctr"/>
-            <a:lstStyle/>
-            <a:p>
-              <a:pPr algn="ctr"/>
-              <a:endParaRPr lang="en-IN"/>
-            </a:p>
-          </p:txBody>
-        </p:sp>
-      </p:grpSp>
-      <p:grpSp>
-        <p:nvGrpSpPr>
-          <p:cNvPr id="135" name="Group 134"/>
-          <p:cNvGrpSpPr/>
-          <p:nvPr/>
-        </p:nvGrpSpPr>
-        <p:grpSpPr>
-          <a:xfrm>
-            <a:off x="467544" y="1484784"/>
-            <a:ext cx="1728192" cy="1152128"/>
-            <a:chOff x="539552" y="1412776"/>
-            <a:chExt cx="1728192" cy="1152128"/>
-          </a:xfrm>
-        </p:grpSpPr>
-        <p:sp>
-          <p:nvSpPr>
-            <p:cNvPr id="77" name="TextBox 76"/>
-            <p:cNvSpPr txBox="1"/>
-            <p:nvPr/>
-          </p:nvSpPr>
-          <p:spPr>
-            <a:xfrm>
-              <a:off x="931138" y="1484784"/>
-              <a:ext cx="919098" cy="1015663"/>
-            </a:xfrm>
-            <a:prstGeom prst="rect">
-              <a:avLst/>
-            </a:prstGeom>
-            <a:noFill/>
-          </p:spPr>
-          <p:txBody>
-            <a:bodyPr wrap="none" rtlCol="0">
-              <a:spAutoFit/>
-            </a:bodyPr>
-            <a:lstStyle/>
-            <a:p>
-              <a:pPr algn="ctr"/>
-              <a:r>
-                <a:rPr lang="en-IN" dirty="0"/>
-                <a:t>2</a:t>
-              </a:r>
-              <a:endParaRPr lang="en-IN" dirty="0" smtClean="0"/>
-            </a:p>
-            <a:p>
-              <a:pPr algn="ctr"/>
-              <a:r>
-                <a:rPr lang="en-IN" sz="1400" dirty="0" smtClean="0"/>
-                <a:t>Desktop </a:t>
-              </a:r>
-            </a:p>
-            <a:p>
-              <a:pPr algn="ctr"/>
-              <a:r>
-                <a:rPr lang="en-IN" sz="1400" dirty="0" smtClean="0"/>
-                <a:t>Client </a:t>
-              </a:r>
-            </a:p>
-            <a:p>
-              <a:pPr algn="ctr"/>
-              <a:r>
-                <a:rPr lang="en-IN" sz="1400" dirty="0" smtClean="0"/>
-                <a:t>Controller</a:t>
-              </a:r>
-              <a:endParaRPr lang="en-IN" sz="1400" dirty="0"/>
-            </a:p>
-          </p:txBody>
-        </p:sp>
-        <p:sp>
-          <p:nvSpPr>
-            <p:cNvPr id="47" name="Oval 46"/>
-            <p:cNvSpPr/>
-            <p:nvPr/>
-          </p:nvSpPr>
-          <p:spPr>
-            <a:xfrm>
-              <a:off x="539552" y="1412776"/>
-              <a:ext cx="1728192" cy="1152128"/>
-            </a:xfrm>
-            <a:prstGeom prst="ellipse">
-              <a:avLst/>
-            </a:prstGeom>
-            <a:noFill/>
-            <a:ln>
-              <a:solidFill>
-                <a:schemeClr val="tx1"/>
-              </a:solidFill>
-            </a:ln>
-          </p:spPr>
-          <p:style>
-            <a:lnRef idx="2">
-              <a:schemeClr val="accent1">
-                <a:shade val="50000"/>
-              </a:schemeClr>
-            </a:lnRef>
-            <a:fillRef idx="1">
-              <a:schemeClr val="accent1"/>
-            </a:fillRef>
-            <a:effectRef idx="0">
-              <a:schemeClr val="accent1"/>
-            </a:effectRef>
-            <a:fontRef idx="minor">
-              <a:schemeClr val="lt1"/>
-            </a:fontRef>
-          </p:style>
-          <p:txBody>
-            <a:bodyPr rtlCol="0" anchor="ctr"/>
-            <a:lstStyle/>
-            <a:p>
-              <a:pPr algn="ctr"/>
-              <a:endParaRPr lang="en-IN" dirty="0"/>
-            </a:p>
-          </p:txBody>
-        </p:sp>
-      </p:grpSp>
-      <p:grpSp>
-        <p:nvGrpSpPr>
-          <p:cNvPr id="134" name="Group 133"/>
-          <p:cNvGrpSpPr/>
-          <p:nvPr/>
-        </p:nvGrpSpPr>
-        <p:grpSpPr>
-          <a:xfrm>
-            <a:off x="6804248" y="4221088"/>
-            <a:ext cx="1728192" cy="1159679"/>
-            <a:chOff x="6804248" y="4221088"/>
-            <a:chExt cx="1728192" cy="1159679"/>
           </a:xfrm>
         </p:grpSpPr>
         <p:sp>
@@ -4355,7 +4122,7 @@
           <p:spPr>
             <a:xfrm>
               <a:off x="7267842" y="4365104"/>
-              <a:ext cx="919098" cy="1015663"/>
+              <a:ext cx="919098" cy="800219"/>
             </a:xfrm>
             <a:prstGeom prst="rect">
               <a:avLst/>
@@ -4378,15 +4145,9 @@
               <a:pPr algn="ctr"/>
               <a:r>
                 <a:rPr lang="en-US" sz="1400" dirty="0" smtClean="0"/>
-                <a:t>Mobile</a:t>
+                <a:t>File</a:t>
               </a:r>
-            </a:p>
-            <a:p>
-              <a:pPr algn="ctr"/>
-              <a:r>
-                <a:rPr lang="en-US" sz="1400" dirty="0" smtClean="0"/>
-                <a:t>Client</a:t>
-              </a:r>
+              <a:endParaRPr lang="en-US" sz="1400" dirty="0" smtClean="0"/>
             </a:p>
             <a:p>
               <a:pPr algn="ctr"/>
@@ -4568,7 +4329,7 @@
         </p:nvGrpSpPr>
         <p:grpSpPr>
           <a:xfrm>
-            <a:off x="3491880" y="476672"/>
+            <a:off x="1187624" y="764704"/>
             <a:ext cx="1728192" cy="1364670"/>
             <a:chOff x="3851920" y="116632"/>
             <a:chExt cx="1728192" cy="1364670"/>
@@ -4679,83 +4440,6 @@
           </p:txBody>
         </p:sp>
       </p:grpSp>
-      <p:sp>
-        <p:nvSpPr>
-          <p:cNvPr id="50" name="Rectangle 49"/>
-          <p:cNvSpPr/>
-          <p:nvPr/>
-        </p:nvSpPr>
-        <p:spPr>
-          <a:xfrm>
-            <a:off x="179512" y="404664"/>
-            <a:ext cx="1584176" cy="504056"/>
-          </a:xfrm>
-          <a:prstGeom prst="rect">
-            <a:avLst/>
-          </a:prstGeom>
-          <a:noFill/>
-          <a:ln>
-            <a:solidFill>
-              <a:schemeClr val="tx1"/>
-            </a:solidFill>
-          </a:ln>
-        </p:spPr>
-        <p:style>
-          <a:lnRef idx="2">
-            <a:schemeClr val="accent1">
-              <a:shade val="50000"/>
-            </a:schemeClr>
-          </a:lnRef>
-          <a:fillRef idx="1">
-            <a:schemeClr val="accent1"/>
-          </a:fillRef>
-          <a:effectRef idx="0">
-            <a:schemeClr val="accent1"/>
-          </a:effectRef>
-          <a:fontRef idx="minor">
-            <a:schemeClr val="lt1"/>
-          </a:fontRef>
-        </p:style>
-        <p:txBody>
-          <a:bodyPr rtlCol="0" anchor="ctr"/>
-          <a:lstStyle/>
-          <a:p>
-            <a:pPr algn="ctr"/>
-            <a:endParaRPr lang="en-IN"/>
-          </a:p>
-        </p:txBody>
-      </p:sp>
-      <p:sp>
-        <p:nvSpPr>
-          <p:cNvPr id="51" name="TextBox 50"/>
-          <p:cNvSpPr txBox="1"/>
-          <p:nvPr/>
-        </p:nvSpPr>
-        <p:spPr>
-          <a:xfrm>
-            <a:off x="179512" y="467380"/>
-            <a:ext cx="1548117" cy="369332"/>
-          </a:xfrm>
-          <a:prstGeom prst="rect">
-            <a:avLst/>
-          </a:prstGeom>
-          <a:noFill/>
-        </p:spPr>
-        <p:txBody>
-          <a:bodyPr wrap="none" rtlCol="0">
-            <a:spAutoFit/>
-          </a:bodyPr>
-          <a:lstStyle/>
-          <a:p>
-            <a:pPr algn="ctr"/>
-            <a:r>
-              <a:rPr lang="en-US" dirty="0" smtClean="0"/>
-              <a:t>Desktop Client</a:t>
-            </a:r>
-            <a:endParaRPr lang="en-IN" dirty="0"/>
-          </a:p>
-        </p:txBody>
-      </p:sp>
       <p:grpSp>
         <p:nvGrpSpPr>
           <p:cNvPr id="53" name="Group 52"/>
@@ -4850,105 +4534,13 @@
       </p:grpSp>
       <p:grpSp>
         <p:nvGrpSpPr>
-          <p:cNvPr id="56" name="Group 55"/>
+          <p:cNvPr id="59" name="Group 58"/>
           <p:cNvGrpSpPr/>
           <p:nvPr/>
         </p:nvGrpSpPr>
         <p:grpSpPr>
           <a:xfrm>
-            <a:off x="2123728" y="6309320"/>
-            <a:ext cx="1584176" cy="504056"/>
-            <a:chOff x="251520" y="764704"/>
-            <a:chExt cx="1584176" cy="504056"/>
-          </a:xfrm>
-        </p:grpSpPr>
-        <p:sp>
-          <p:nvSpPr>
-            <p:cNvPr id="57" name="Rectangle 56"/>
-            <p:cNvSpPr/>
-            <p:nvPr/>
-          </p:nvSpPr>
-          <p:spPr>
-            <a:xfrm>
-              <a:off x="251520" y="764704"/>
-              <a:ext cx="1584176" cy="504056"/>
-            </a:xfrm>
-            <a:prstGeom prst="rect">
-              <a:avLst/>
-            </a:prstGeom>
-            <a:noFill/>
-            <a:ln>
-              <a:solidFill>
-                <a:schemeClr val="tx1"/>
-              </a:solidFill>
-            </a:ln>
-          </p:spPr>
-          <p:style>
-            <a:lnRef idx="2">
-              <a:schemeClr val="accent1">
-                <a:shade val="50000"/>
-              </a:schemeClr>
-            </a:lnRef>
-            <a:fillRef idx="1">
-              <a:schemeClr val="accent1"/>
-            </a:fillRef>
-            <a:effectRef idx="0">
-              <a:schemeClr val="accent1"/>
-            </a:effectRef>
-            <a:fontRef idx="minor">
-              <a:schemeClr val="lt1"/>
-            </a:fontRef>
-          </p:style>
-          <p:txBody>
-            <a:bodyPr rtlCol="0" anchor="ctr"/>
-            <a:lstStyle/>
-            <a:p>
-              <a:pPr algn="ctr"/>
-              <a:endParaRPr lang="en-IN"/>
-            </a:p>
-          </p:txBody>
-        </p:sp>
-        <p:sp>
-          <p:nvSpPr>
-            <p:cNvPr id="58" name="TextBox 57"/>
-            <p:cNvSpPr txBox="1"/>
-            <p:nvPr/>
-          </p:nvSpPr>
-          <p:spPr>
-            <a:xfrm>
-              <a:off x="626271" y="836712"/>
-              <a:ext cx="798617" cy="369332"/>
-            </a:xfrm>
-            <a:prstGeom prst="rect">
-              <a:avLst/>
-            </a:prstGeom>
-            <a:noFill/>
-          </p:spPr>
-          <p:txBody>
-            <a:bodyPr wrap="none" rtlCol="0">
-              <a:spAutoFit/>
-            </a:bodyPr>
-            <a:lstStyle/>
-            <a:p>
-              <a:pPr algn="ctr"/>
-              <a:r>
-                <a:rPr lang="en-US" dirty="0" smtClean="0"/>
-                <a:t>Admin</a:t>
-              </a:r>
-              <a:endParaRPr lang="en-IN" dirty="0"/>
-            </a:p>
-          </p:txBody>
-        </p:sp>
-      </p:grpSp>
-      <p:grpSp>
-        <p:nvGrpSpPr>
-          <p:cNvPr id="59" name="Group 58"/>
-          <p:cNvGrpSpPr/>
-          <p:nvPr/>
-        </p:nvGrpSpPr>
-        <p:grpSpPr>
-          <a:xfrm>
-            <a:off x="7380312" y="5661248"/>
+            <a:off x="7236296" y="6165304"/>
             <a:ext cx="1584176" cy="504056"/>
             <a:chOff x="251520" y="764704"/>
             <a:chExt cx="1584176" cy="504056"/>
@@ -5008,8 +4600,8 @@
           </p:nvSpPr>
           <p:spPr>
             <a:xfrm>
-              <a:off x="305125" y="836712"/>
-              <a:ext cx="1440907" cy="369332"/>
+              <a:off x="769739" y="836712"/>
+              <a:ext cx="511680" cy="369332"/>
             </a:xfrm>
             <a:prstGeom prst="rect">
               <a:avLst/>
@@ -5025,7 +4617,7 @@
               <a:pPr algn="ctr"/>
               <a:r>
                 <a:rPr lang="en-US" dirty="0" smtClean="0"/>
-                <a:t>Mobile Client</a:t>
+                <a:t>File</a:t>
               </a:r>
               <a:endParaRPr lang="en-IN" dirty="0"/>
             </a:p>
@@ -5132,7 +4724,7 @@
         </p:nvGrpSpPr>
         <p:grpSpPr>
           <a:xfrm>
-            <a:off x="1859445" y="188640"/>
+            <a:off x="59245" y="188640"/>
             <a:ext cx="1632435" cy="718339"/>
             <a:chOff x="209361" y="764704"/>
             <a:chExt cx="1632435" cy="718339"/>
@@ -5227,7 +4819,7 @@
         </p:nvGrpSpPr>
         <p:grpSpPr>
           <a:xfrm>
-            <a:off x="5148064" y="116632"/>
+            <a:off x="3923928" y="116632"/>
             <a:ext cx="2304256" cy="504056"/>
             <a:chOff x="6228184" y="188640"/>
             <a:chExt cx="2304256" cy="504056"/>
@@ -5619,8 +5211,8 @@
           </p:nvSpPr>
           <p:spPr>
             <a:xfrm>
-              <a:off x="6372200" y="251356"/>
-              <a:ext cx="1515928" cy="369332"/>
+              <a:off x="6666081" y="251356"/>
+              <a:ext cx="930255" cy="369332"/>
             </a:xfrm>
             <a:prstGeom prst="rect">
               <a:avLst/>
@@ -5635,7 +5227,7 @@
             <a:p>
               <a:r>
                 <a:rPr lang="en-US" dirty="0" smtClean="0"/>
-                <a:t>Mobile details</a:t>
+                <a:t>File Info</a:t>
               </a:r>
               <a:endParaRPr lang="en-IN" dirty="0"/>
             </a:p>
@@ -5666,162 +5258,6 @@
               <a:r>
                 <a:rPr lang="en-US" dirty="0" smtClean="0"/>
                 <a:t>D4</a:t>
-              </a:r>
-              <a:endParaRPr lang="en-IN" dirty="0"/>
-            </a:p>
-          </p:txBody>
-        </p:sp>
-      </p:grpSp>
-      <p:grpSp>
-        <p:nvGrpSpPr>
-          <p:cNvPr id="113" name="Group 112"/>
-          <p:cNvGrpSpPr/>
-          <p:nvPr/>
-        </p:nvGrpSpPr>
-        <p:grpSpPr>
-          <a:xfrm>
-            <a:off x="5580112" y="6237312"/>
-            <a:ext cx="2304256" cy="504056"/>
-            <a:chOff x="6228184" y="188640"/>
-            <a:chExt cx="2304256" cy="504056"/>
-          </a:xfrm>
-        </p:grpSpPr>
-        <p:sp>
-          <p:nvSpPr>
-            <p:cNvPr id="114" name="Rectangle 113"/>
-            <p:cNvSpPr/>
-            <p:nvPr/>
-          </p:nvSpPr>
-          <p:spPr>
-            <a:xfrm>
-              <a:off x="6228184" y="188640"/>
-              <a:ext cx="2304256" cy="504056"/>
-            </a:xfrm>
-            <a:prstGeom prst="rect">
-              <a:avLst/>
-            </a:prstGeom>
-            <a:noFill/>
-            <a:ln>
-              <a:solidFill>
-                <a:schemeClr val="tx1"/>
-              </a:solidFill>
-            </a:ln>
-          </p:spPr>
-          <p:style>
-            <a:lnRef idx="2">
-              <a:schemeClr val="accent1">
-                <a:shade val="50000"/>
-              </a:schemeClr>
-            </a:lnRef>
-            <a:fillRef idx="1">
-              <a:schemeClr val="accent1"/>
-            </a:fillRef>
-            <a:effectRef idx="0">
-              <a:schemeClr val="accent1"/>
-            </a:effectRef>
-            <a:fontRef idx="minor">
-              <a:schemeClr val="lt1"/>
-            </a:fontRef>
-          </p:style>
-          <p:txBody>
-            <a:bodyPr rtlCol="0" anchor="ctr"/>
-            <a:lstStyle/>
-            <a:p>
-              <a:pPr algn="ctr"/>
-              <a:endParaRPr lang="en-IN"/>
-            </a:p>
-          </p:txBody>
-        </p:sp>
-        <p:cxnSp>
-          <p:nvCxnSpPr>
-            <p:cNvPr id="115" name="Straight Connector 114"/>
-            <p:cNvCxnSpPr/>
-            <p:nvPr/>
-          </p:nvCxnSpPr>
-          <p:spPr>
-            <a:xfrm>
-              <a:off x="7956376" y="188640"/>
-              <a:ext cx="0" cy="504056"/>
-            </a:xfrm>
-            <a:prstGeom prst="line">
-              <a:avLst/>
-            </a:prstGeom>
-            <a:ln>
-              <a:solidFill>
-                <a:schemeClr val="tx1"/>
-              </a:solidFill>
-            </a:ln>
-          </p:spPr>
-          <p:style>
-            <a:lnRef idx="1">
-              <a:schemeClr val="accent1"/>
-            </a:lnRef>
-            <a:fillRef idx="0">
-              <a:schemeClr val="accent1"/>
-            </a:fillRef>
-            <a:effectRef idx="0">
-              <a:schemeClr val="accent1"/>
-            </a:effectRef>
-            <a:fontRef idx="minor">
-              <a:schemeClr val="tx1"/>
-            </a:fontRef>
-          </p:style>
-        </p:cxnSp>
-        <p:sp>
-          <p:nvSpPr>
-            <p:cNvPr id="117" name="TextBox 116"/>
-            <p:cNvSpPr txBox="1"/>
-            <p:nvPr/>
-          </p:nvSpPr>
-          <p:spPr>
-            <a:xfrm>
-              <a:off x="6372200" y="251356"/>
-              <a:ext cx="1467838" cy="369332"/>
-            </a:xfrm>
-            <a:prstGeom prst="rect">
-              <a:avLst/>
-            </a:prstGeom>
-            <a:noFill/>
-          </p:spPr>
-          <p:txBody>
-            <a:bodyPr wrap="none" rtlCol="0">
-              <a:spAutoFit/>
-            </a:bodyPr>
-            <a:lstStyle/>
-            <a:p>
-              <a:r>
-                <a:rPr lang="en-US" dirty="0" smtClean="0"/>
-                <a:t>Admin details</a:t>
-              </a:r>
-              <a:endParaRPr lang="en-IN" dirty="0"/>
-            </a:p>
-          </p:txBody>
-        </p:sp>
-        <p:sp>
-          <p:nvSpPr>
-            <p:cNvPr id="118" name="TextBox 117"/>
-            <p:cNvSpPr txBox="1"/>
-            <p:nvPr/>
-          </p:nvSpPr>
-          <p:spPr>
-            <a:xfrm>
-              <a:off x="8028384" y="260648"/>
-              <a:ext cx="444352" cy="369332"/>
-            </a:xfrm>
-            <a:prstGeom prst="rect">
-              <a:avLst/>
-            </a:prstGeom>
-            <a:noFill/>
-          </p:spPr>
-          <p:txBody>
-            <a:bodyPr wrap="none" rtlCol="0">
-              <a:spAutoFit/>
-            </a:bodyPr>
-            <a:lstStyle/>
-            <a:p>
-              <a:r>
-                <a:rPr lang="en-US" dirty="0" smtClean="0"/>
-                <a:t>D5</a:t>
               </a:r>
               <a:endParaRPr lang="en-IN" dirty="0"/>
             </a:p>
@@ -5984,278 +5420,6 @@
           </p:txBody>
         </p:sp>
       </p:grpSp>
-      <p:grpSp>
-        <p:nvGrpSpPr>
-          <p:cNvPr id="126" name="Group 125"/>
-          <p:cNvGrpSpPr/>
-          <p:nvPr/>
-        </p:nvGrpSpPr>
-        <p:grpSpPr>
-          <a:xfrm>
-            <a:off x="107504" y="3140968"/>
-            <a:ext cx="2304256" cy="504056"/>
-            <a:chOff x="6228184" y="188640"/>
-            <a:chExt cx="2304256" cy="504056"/>
-          </a:xfrm>
-        </p:grpSpPr>
-        <p:sp>
-          <p:nvSpPr>
-            <p:cNvPr id="127" name="Rectangle 126"/>
-            <p:cNvSpPr/>
-            <p:nvPr/>
-          </p:nvSpPr>
-          <p:spPr>
-            <a:xfrm>
-              <a:off x="6228184" y="188640"/>
-              <a:ext cx="2304256" cy="504056"/>
-            </a:xfrm>
-            <a:prstGeom prst="rect">
-              <a:avLst/>
-            </a:prstGeom>
-            <a:noFill/>
-            <a:ln>
-              <a:solidFill>
-                <a:schemeClr val="tx1"/>
-              </a:solidFill>
-            </a:ln>
-          </p:spPr>
-          <p:style>
-            <a:lnRef idx="2">
-              <a:schemeClr val="accent1">
-                <a:shade val="50000"/>
-              </a:schemeClr>
-            </a:lnRef>
-            <a:fillRef idx="1">
-              <a:schemeClr val="accent1"/>
-            </a:fillRef>
-            <a:effectRef idx="0">
-              <a:schemeClr val="accent1"/>
-            </a:effectRef>
-            <a:fontRef idx="minor">
-              <a:schemeClr val="lt1"/>
-            </a:fontRef>
-          </p:style>
-          <p:txBody>
-            <a:bodyPr rtlCol="0" anchor="ctr"/>
-            <a:lstStyle/>
-            <a:p>
-              <a:pPr algn="ctr"/>
-              <a:endParaRPr lang="en-IN"/>
-            </a:p>
-          </p:txBody>
-        </p:sp>
-        <p:cxnSp>
-          <p:nvCxnSpPr>
-            <p:cNvPr id="129" name="Straight Connector 128"/>
-            <p:cNvCxnSpPr/>
-            <p:nvPr/>
-          </p:nvCxnSpPr>
-          <p:spPr>
-            <a:xfrm>
-              <a:off x="7956376" y="188640"/>
-              <a:ext cx="0" cy="504056"/>
-            </a:xfrm>
-            <a:prstGeom prst="line">
-              <a:avLst/>
-            </a:prstGeom>
-            <a:ln>
-              <a:solidFill>
-                <a:schemeClr val="tx1"/>
-              </a:solidFill>
-            </a:ln>
-          </p:spPr>
-          <p:style>
-            <a:lnRef idx="1">
-              <a:schemeClr val="accent1"/>
-            </a:lnRef>
-            <a:fillRef idx="0">
-              <a:schemeClr val="accent1"/>
-            </a:fillRef>
-            <a:effectRef idx="0">
-              <a:schemeClr val="accent1"/>
-            </a:effectRef>
-            <a:fontRef idx="minor">
-              <a:schemeClr val="tx1"/>
-            </a:fontRef>
-          </p:style>
-        </p:cxnSp>
-        <p:sp>
-          <p:nvSpPr>
-            <p:cNvPr id="131" name="TextBox 130"/>
-            <p:cNvSpPr txBox="1"/>
-            <p:nvPr/>
-          </p:nvSpPr>
-          <p:spPr>
-            <a:xfrm>
-              <a:off x="6300192" y="251356"/>
-              <a:ext cx="1784336" cy="369332"/>
-            </a:xfrm>
-            <a:prstGeom prst="rect">
-              <a:avLst/>
-            </a:prstGeom>
-            <a:noFill/>
-          </p:spPr>
-          <p:txBody>
-            <a:bodyPr wrap="square" rtlCol="0">
-              <a:spAutoFit/>
-            </a:bodyPr>
-            <a:lstStyle/>
-            <a:p>
-              <a:r>
-                <a:rPr lang="en-US" dirty="0" smtClean="0"/>
-                <a:t>Desktop file info</a:t>
-              </a:r>
-              <a:endParaRPr lang="en-IN" dirty="0"/>
-            </a:p>
-          </p:txBody>
-        </p:sp>
-        <p:sp>
-          <p:nvSpPr>
-            <p:cNvPr id="132" name="TextBox 131"/>
-            <p:cNvSpPr txBox="1"/>
-            <p:nvPr/>
-          </p:nvSpPr>
-          <p:spPr>
-            <a:xfrm>
-              <a:off x="8028384" y="260648"/>
-              <a:ext cx="444352" cy="369332"/>
-            </a:xfrm>
-            <a:prstGeom prst="rect">
-              <a:avLst/>
-            </a:prstGeom>
-            <a:noFill/>
-          </p:spPr>
-          <p:txBody>
-            <a:bodyPr wrap="none" rtlCol="0">
-              <a:spAutoFit/>
-            </a:bodyPr>
-            <a:lstStyle/>
-            <a:p>
-              <a:r>
-                <a:rPr lang="en-US" dirty="0" smtClean="0"/>
-                <a:t>D1</a:t>
-              </a:r>
-              <a:endParaRPr lang="en-IN" dirty="0"/>
-            </a:p>
-          </p:txBody>
-        </p:sp>
-      </p:grpSp>
-      <p:cxnSp>
-        <p:nvCxnSpPr>
-          <p:cNvPr id="140" name="Elbow Connector 139"/>
-          <p:cNvCxnSpPr>
-            <a:stCxn id="57" idx="0"/>
-            <a:endCxn id="46" idx="2"/>
-          </p:cNvCxnSpPr>
-          <p:nvPr/>
-        </p:nvCxnSpPr>
-        <p:spPr>
-          <a:xfrm rot="5400000" flipH="1" flipV="1">
-            <a:off x="2879812" y="5481228"/>
-            <a:ext cx="864096" cy="792088"/>
-          </a:xfrm>
-          <a:prstGeom prst="bentConnector2">
-            <a:avLst/>
-          </a:prstGeom>
-          <a:ln>
-            <a:solidFill>
-              <a:schemeClr val="tx1"/>
-            </a:solidFill>
-            <a:tailEnd type="arrow"/>
-          </a:ln>
-        </p:spPr>
-        <p:style>
-          <a:lnRef idx="1">
-            <a:schemeClr val="accent1"/>
-          </a:lnRef>
-          <a:fillRef idx="0">
-            <a:schemeClr val="accent1"/>
-          </a:fillRef>
-          <a:effectRef idx="0">
-            <a:schemeClr val="accent1"/>
-          </a:effectRef>
-          <a:fontRef idx="minor">
-            <a:schemeClr val="tx1"/>
-          </a:fontRef>
-        </p:style>
-      </p:cxnSp>
-      <p:cxnSp>
-        <p:nvCxnSpPr>
-          <p:cNvPr id="142" name="Elbow Connector 139"/>
-          <p:cNvCxnSpPr>
-            <a:stCxn id="46" idx="6"/>
-          </p:cNvCxnSpPr>
-          <p:nvPr/>
-        </p:nvCxnSpPr>
-        <p:spPr>
-          <a:xfrm>
-            <a:off x="5436096" y="5445224"/>
-            <a:ext cx="792088" cy="792088"/>
-          </a:xfrm>
-          <a:prstGeom prst="bentConnector2">
-            <a:avLst/>
-          </a:prstGeom>
-          <a:ln>
-            <a:solidFill>
-              <a:schemeClr val="tx1"/>
-            </a:solidFill>
-            <a:tailEnd type="arrow"/>
-          </a:ln>
-        </p:spPr>
-        <p:style>
-          <a:lnRef idx="1">
-            <a:schemeClr val="accent1"/>
-          </a:lnRef>
-          <a:fillRef idx="0">
-            <a:schemeClr val="accent1"/>
-          </a:fillRef>
-          <a:effectRef idx="0">
-            <a:schemeClr val="accent1"/>
-          </a:effectRef>
-          <a:fontRef idx="minor">
-            <a:schemeClr val="tx1"/>
-          </a:fontRef>
-        </p:style>
-      </p:cxnSp>
-      <p:cxnSp>
-        <p:nvCxnSpPr>
-          <p:cNvPr id="150" name="Elbow Connector 139"/>
-          <p:cNvCxnSpPr>
-            <a:stCxn id="114" idx="1"/>
-            <a:endCxn id="46" idx="4"/>
-          </p:cNvCxnSpPr>
-          <p:nvPr/>
-        </p:nvCxnSpPr>
-        <p:spPr>
-          <a:xfrm rot="10800000">
-            <a:off x="4572000" y="6021288"/>
-            <a:ext cx="1008112" cy="468052"/>
-          </a:xfrm>
-          <a:prstGeom prst="bentConnector2">
-            <a:avLst/>
-          </a:prstGeom>
-          <a:ln>
-            <a:solidFill>
-              <a:schemeClr val="tx1"/>
-            </a:solidFill>
-            <a:tailEnd type="arrow"/>
-          </a:ln>
-        </p:spPr>
-        <p:style>
-          <a:lnRef idx="1">
-            <a:schemeClr val="accent1"/>
-          </a:lnRef>
-          <a:fillRef idx="0">
-            <a:schemeClr val="accent1"/>
-          </a:fillRef>
-          <a:effectRef idx="0">
-            <a:schemeClr val="accent1"/>
-          </a:effectRef>
-          <a:fontRef idx="minor">
-            <a:schemeClr val="tx1"/>
-          </a:fontRef>
-        </p:style>
-      </p:cxnSp>
       <p:cxnSp>
         <p:nvCxnSpPr>
           <p:cNvPr id="172" name="Elbow Connector 139"/>
@@ -6267,8 +5431,8 @@
         </p:nvCxnSpPr>
         <p:spPr>
           <a:xfrm rot="10800000">
-            <a:off x="7057336" y="5204492"/>
-            <a:ext cx="322976" cy="708785"/>
+            <a:off x="6481272" y="5636540"/>
+            <a:ext cx="755024" cy="780793"/>
           </a:xfrm>
           <a:prstGeom prst="bentConnector2">
             <a:avLst/>
@@ -6305,8 +5469,8 @@
         </p:nvCxnSpPr>
         <p:spPr>
           <a:xfrm flipV="1">
-            <a:off x="8532440" y="3933056"/>
-            <a:ext cx="215516" cy="864096"/>
+            <a:off x="7956376" y="3933056"/>
+            <a:ext cx="576064" cy="1296144"/>
           </a:xfrm>
           <a:prstGeom prst="bentConnector2">
             <a:avLst/>
@@ -6343,15 +5507,12 @@
           <p:nvPr/>
         </p:nvCxnSpPr>
         <p:spPr>
-          <a:xfrm rot="10800000" flipH="1" flipV="1">
-            <a:off x="6660232" y="3681027"/>
-            <a:ext cx="397104" cy="708785"/>
-          </a:xfrm>
-          <a:prstGeom prst="bentConnector4">
-            <a:avLst>
-              <a:gd name="adj1" fmla="val -57567"/>
-              <a:gd name="adj2" fmla="val 73347"/>
-            </a:avLst>
+          <a:xfrm rot="10800000" flipV="1">
+            <a:off x="6481272" y="3681027"/>
+            <a:ext cx="178960" cy="1140833"/>
+          </a:xfrm>
+          <a:prstGeom prst="bentConnector2">
+            <a:avLst/>
           </a:prstGeom>
           <a:ln>
             <a:solidFill>
@@ -6497,19 +5658,18 @@
         <p:nvCxnSpPr>
           <p:cNvPr id="190" name="Elbow Connector 139"/>
           <p:cNvCxnSpPr>
+            <a:stCxn id="66" idx="2"/>
             <a:endCxn id="44" idx="2"/>
           </p:cNvCxnSpPr>
           <p:nvPr/>
         </p:nvCxnSpPr>
         <p:spPr>
-          <a:xfrm>
-            <a:off x="2843808" y="692696"/>
-            <a:ext cx="648072" cy="360040"/>
-          </a:xfrm>
-          <a:prstGeom prst="bentConnector3">
-            <a:avLst>
-              <a:gd name="adj1" fmla="val -2097"/>
-            </a:avLst>
+          <a:xfrm rot="16200000" flipH="1">
+            <a:off x="716522" y="869666"/>
+            <a:ext cx="648072" cy="294132"/>
+          </a:xfrm>
+          <a:prstGeom prst="bentConnector2">
+            <a:avLst/>
           </a:prstGeom>
           <a:ln>
             <a:solidFill>
@@ -6537,14 +5697,15 @@
         <p:nvCxnSpPr>
           <p:cNvPr id="193" name="Elbow Connector 139"/>
           <p:cNvCxnSpPr>
+            <a:stCxn id="70" idx="1"/>
             <a:endCxn id="44" idx="0"/>
           </p:cNvCxnSpPr>
           <p:nvPr/>
         </p:nvCxnSpPr>
         <p:spPr>
           <a:xfrm rot="10800000" flipV="1">
-            <a:off x="4355976" y="332656"/>
-            <a:ext cx="792088" cy="144016"/>
+            <a:off x="2051720" y="368660"/>
+            <a:ext cx="1872208" cy="396044"/>
           </a:xfrm>
           <a:prstGeom prst="bentConnector2">
             <a:avLst/>
@@ -6582,87 +5743,11 @@
         </p:nvCxnSpPr>
         <p:spPr>
           <a:xfrm flipV="1">
-            <a:off x="5220072" y="620688"/>
-            <a:ext cx="1080120" cy="432048"/>
+            <a:off x="2915816" y="620688"/>
+            <a:ext cx="2160240" cy="720080"/>
           </a:xfrm>
           <a:prstGeom prst="bentConnector2">
             <a:avLst/>
-          </a:prstGeom>
-          <a:ln>
-            <a:solidFill>
-              <a:schemeClr val="tx1"/>
-            </a:solidFill>
-            <a:tailEnd type="arrow"/>
-          </a:ln>
-        </p:spPr>
-        <p:style>
-          <a:lnRef idx="1">
-            <a:schemeClr val="accent1"/>
-          </a:lnRef>
-          <a:fillRef idx="0">
-            <a:schemeClr val="accent1"/>
-          </a:fillRef>
-          <a:effectRef idx="0">
-            <a:schemeClr val="accent1"/>
-          </a:effectRef>
-          <a:fontRef idx="minor">
-            <a:schemeClr val="tx1"/>
-          </a:fontRef>
-        </p:style>
-      </p:cxnSp>
-      <p:cxnSp>
-        <p:nvCxnSpPr>
-          <p:cNvPr id="208" name="Elbow Connector 139"/>
-          <p:cNvCxnSpPr/>
-          <p:nvPr/>
-        </p:nvCxnSpPr>
-        <p:spPr>
-          <a:xfrm rot="5400000">
-            <a:off x="-180528" y="2492896"/>
-            <a:ext cx="1152128" cy="144016"/>
-          </a:xfrm>
-          <a:prstGeom prst="bentConnector3">
-            <a:avLst>
-              <a:gd name="adj1" fmla="val -431"/>
-            </a:avLst>
-          </a:prstGeom>
-          <a:ln>
-            <a:solidFill>
-              <a:schemeClr val="tx1"/>
-            </a:solidFill>
-            <a:tailEnd type="arrow"/>
-          </a:ln>
-        </p:spPr>
-        <p:style>
-          <a:lnRef idx="1">
-            <a:schemeClr val="accent1"/>
-          </a:lnRef>
-          <a:fillRef idx="0">
-            <a:schemeClr val="accent1"/>
-          </a:fillRef>
-          <a:effectRef idx="0">
-            <a:schemeClr val="accent1"/>
-          </a:effectRef>
-          <a:fontRef idx="minor">
-            <a:schemeClr val="tx1"/>
-          </a:fontRef>
-        </p:style>
-      </p:cxnSp>
-      <p:cxnSp>
-        <p:nvCxnSpPr>
-          <p:cNvPr id="211" name="Elbow Connector 139"/>
-          <p:cNvCxnSpPr/>
-          <p:nvPr/>
-        </p:nvCxnSpPr>
-        <p:spPr>
-          <a:xfrm rot="10800000">
-            <a:off x="2195736" y="2060848"/>
-            <a:ext cx="1440160" cy="1224136"/>
-          </a:xfrm>
-          <a:prstGeom prst="bentConnector3">
-            <a:avLst>
-              <a:gd name="adj1" fmla="val 45370"/>
-            </a:avLst>
           </a:prstGeom>
           <a:ln>
             <a:solidFill>
@@ -6730,14 +5815,12 @@
       <p:cxnSp>
         <p:nvCxnSpPr>
           <p:cNvPr id="230" name="Elbow Connector 139"/>
-          <p:cNvCxnSpPr>
-            <a:stCxn id="67" idx="5"/>
-          </p:cNvCxnSpPr>
+          <p:cNvCxnSpPr/>
           <p:nvPr/>
         </p:nvCxnSpPr>
         <p:spPr>
           <a:xfrm rot="16200000" flipH="1">
-            <a:off x="5570315" y="3735254"/>
+            <a:off x="4940026" y="3925070"/>
             <a:ext cx="1099716" cy="1547736"/>
           </a:xfrm>
           <a:prstGeom prst="bentConnector2">
@@ -6775,150 +5858,6 @@
           <a:xfrm flipV="1">
             <a:off x="1187624" y="5805264"/>
             <a:ext cx="0" cy="360040"/>
-          </a:xfrm>
-          <a:prstGeom prst="straightConnector1">
-            <a:avLst/>
-          </a:prstGeom>
-          <a:ln>
-            <a:solidFill>
-              <a:schemeClr val="tx1"/>
-            </a:solidFill>
-            <a:tailEnd type="arrow"/>
-          </a:ln>
-        </p:spPr>
-        <p:style>
-          <a:lnRef idx="1">
-            <a:schemeClr val="accent1"/>
-          </a:lnRef>
-          <a:fillRef idx="0">
-            <a:schemeClr val="accent1"/>
-          </a:fillRef>
-          <a:effectRef idx="0">
-            <a:schemeClr val="accent1"/>
-          </a:effectRef>
-          <a:fontRef idx="minor">
-            <a:schemeClr val="tx1"/>
-          </a:fontRef>
-        </p:style>
-      </p:cxnSp>
-      <p:cxnSp>
-        <p:nvCxnSpPr>
-          <p:cNvPr id="236" name="Straight Arrow Connector 235"/>
-          <p:cNvCxnSpPr/>
-          <p:nvPr/>
-        </p:nvCxnSpPr>
-        <p:spPr>
-          <a:xfrm flipV="1">
-            <a:off x="4427984" y="4149080"/>
-            <a:ext cx="0" cy="720080"/>
-          </a:xfrm>
-          <a:prstGeom prst="straightConnector1">
-            <a:avLst/>
-          </a:prstGeom>
-          <a:ln>
-            <a:solidFill>
-              <a:schemeClr val="tx1"/>
-            </a:solidFill>
-            <a:tailEnd type="arrow"/>
-          </a:ln>
-        </p:spPr>
-        <p:style>
-          <a:lnRef idx="1">
-            <a:schemeClr val="accent1"/>
-          </a:lnRef>
-          <a:fillRef idx="0">
-            <a:schemeClr val="accent1"/>
-          </a:fillRef>
-          <a:effectRef idx="0">
-            <a:schemeClr val="accent1"/>
-          </a:effectRef>
-          <a:fontRef idx="minor">
-            <a:schemeClr val="tx1"/>
-          </a:fontRef>
-        </p:style>
-      </p:cxnSp>
-      <p:cxnSp>
-        <p:nvCxnSpPr>
-          <p:cNvPr id="238" name="Straight Arrow Connector 237"/>
-          <p:cNvCxnSpPr/>
-          <p:nvPr/>
-        </p:nvCxnSpPr>
-        <p:spPr>
-          <a:xfrm>
-            <a:off x="4644008" y="4149080"/>
-            <a:ext cx="0" cy="720080"/>
-          </a:xfrm>
-          <a:prstGeom prst="straightConnector1">
-            <a:avLst/>
-          </a:prstGeom>
-          <a:ln>
-            <a:solidFill>
-              <a:schemeClr val="tx1"/>
-            </a:solidFill>
-            <a:tailEnd type="arrow"/>
-          </a:ln>
-        </p:spPr>
-        <p:style>
-          <a:lnRef idx="1">
-            <a:schemeClr val="accent1"/>
-          </a:lnRef>
-          <a:fillRef idx="0">
-            <a:schemeClr val="accent1"/>
-          </a:fillRef>
-          <a:effectRef idx="0">
-            <a:schemeClr val="accent1"/>
-          </a:effectRef>
-          <a:fontRef idx="minor">
-            <a:schemeClr val="tx1"/>
-          </a:fontRef>
-        </p:style>
-      </p:cxnSp>
-      <p:cxnSp>
-        <p:nvCxnSpPr>
-          <p:cNvPr id="243" name="Straight Arrow Connector 242"/>
-          <p:cNvCxnSpPr/>
-          <p:nvPr/>
-        </p:nvCxnSpPr>
-        <p:spPr>
-          <a:xfrm flipV="1">
-            <a:off x="4211960" y="1628800"/>
-            <a:ext cx="0" cy="1296144"/>
-          </a:xfrm>
-          <a:prstGeom prst="straightConnector1">
-            <a:avLst/>
-          </a:prstGeom>
-          <a:ln>
-            <a:solidFill>
-              <a:schemeClr val="tx1"/>
-            </a:solidFill>
-            <a:tailEnd type="arrow"/>
-          </a:ln>
-        </p:spPr>
-        <p:style>
-          <a:lnRef idx="1">
-            <a:schemeClr val="accent1"/>
-          </a:lnRef>
-          <a:fillRef idx="0">
-            <a:schemeClr val="accent1"/>
-          </a:fillRef>
-          <a:effectRef idx="0">
-            <a:schemeClr val="accent1"/>
-          </a:effectRef>
-          <a:fontRef idx="minor">
-            <a:schemeClr val="tx1"/>
-          </a:fontRef>
-        </p:style>
-      </p:cxnSp>
-      <p:cxnSp>
-        <p:nvCxnSpPr>
-          <p:cNvPr id="245" name="Straight Arrow Connector 244"/>
-          <p:cNvCxnSpPr/>
-          <p:nvPr/>
-        </p:nvCxnSpPr>
-        <p:spPr>
-          <a:xfrm>
-            <a:off x="4788024" y="1556792"/>
-            <a:ext cx="0" cy="1296144"/>
           </a:xfrm>
           <a:prstGeom prst="straightConnector1">
             <a:avLst/>
@@ -7026,96 +5965,19 @@
       </p:cxnSp>
       <p:cxnSp>
         <p:nvCxnSpPr>
-          <p:cNvPr id="256" name="Elbow Connector 139"/>
-          <p:cNvCxnSpPr/>
+          <p:cNvPr id="268" name="Elbow Connector 139"/>
+          <p:cNvCxnSpPr>
+            <a:endCxn id="67" idx="6"/>
+          </p:cNvCxnSpPr>
           <p:nvPr/>
         </p:nvCxnSpPr>
         <p:spPr>
-          <a:xfrm>
-            <a:off x="2051720" y="1772816"/>
-            <a:ext cx="1800200" cy="1260140"/>
-          </a:xfrm>
-          <a:prstGeom prst="bentConnector3">
-            <a:avLst>
-              <a:gd name="adj1" fmla="val 83806"/>
-            </a:avLst>
-          </a:prstGeom>
-          <a:ln>
-            <a:solidFill>
-              <a:schemeClr val="tx1"/>
-            </a:solidFill>
-            <a:tailEnd type="arrow"/>
-          </a:ln>
-        </p:spPr>
-        <p:style>
-          <a:lnRef idx="1">
-            <a:schemeClr val="accent1"/>
-          </a:lnRef>
-          <a:fillRef idx="0">
-            <a:schemeClr val="accent1"/>
-          </a:fillRef>
-          <a:effectRef idx="0">
-            <a:schemeClr val="accent1"/>
-          </a:effectRef>
-          <a:fontRef idx="minor">
-            <a:schemeClr val="tx1"/>
-          </a:fontRef>
-        </p:style>
-      </p:cxnSp>
-      <p:cxnSp>
-        <p:nvCxnSpPr>
-          <p:cNvPr id="266" name="Straight Arrow Connector 265"/>
-          <p:cNvCxnSpPr/>
-          <p:nvPr/>
-        </p:nvCxnSpPr>
-        <p:spPr>
-          <a:xfrm flipV="1">
-            <a:off x="1907704" y="2492896"/>
-            <a:ext cx="0" cy="648072"/>
-          </a:xfrm>
-          <a:prstGeom prst="straightConnector1">
+          <a:xfrm rot="16200000" flipV="1">
+            <a:off x="5292080" y="3861048"/>
+            <a:ext cx="1440160" cy="720080"/>
+          </a:xfrm>
+          <a:prstGeom prst="bentConnector2">
             <a:avLst/>
-          </a:prstGeom>
-          <a:ln>
-            <a:solidFill>
-              <a:schemeClr val="tx1"/>
-            </a:solidFill>
-            <a:tailEnd type="arrow"/>
-          </a:ln>
-        </p:spPr>
-        <p:style>
-          <a:lnRef idx="1">
-            <a:schemeClr val="accent1"/>
-          </a:lnRef>
-          <a:fillRef idx="0">
-            <a:schemeClr val="accent1"/>
-          </a:fillRef>
-          <a:effectRef idx="0">
-            <a:schemeClr val="accent1"/>
-          </a:effectRef>
-          <a:fontRef idx="minor">
-            <a:schemeClr val="tx1"/>
-          </a:fontRef>
-        </p:style>
-      </p:cxnSp>
-      <p:cxnSp>
-        <p:nvCxnSpPr>
-          <p:cNvPr id="268" name="Elbow Connector 139"/>
-          <p:cNvCxnSpPr>
-            <a:stCxn id="48" idx="2"/>
-            <a:endCxn id="67" idx="6"/>
-          </p:cNvCxnSpPr>
-          <p:nvPr/>
-        </p:nvCxnSpPr>
-        <p:spPr>
-          <a:xfrm rot="10800000">
-            <a:off x="5652120" y="3501008"/>
-            <a:ext cx="1152128" cy="1296144"/>
-          </a:xfrm>
-          <a:prstGeom prst="bentConnector3">
-            <a:avLst>
-              <a:gd name="adj1" fmla="val 50000"/>
-            </a:avLst>
           </a:prstGeom>
           <a:ln>
             <a:solidFill>
@@ -7223,7 +6085,7 @@
         </p:nvSpPr>
         <p:spPr>
           <a:xfrm>
-            <a:off x="2169847" y="836712"/>
+            <a:off x="107504" y="1196752"/>
             <a:ext cx="1034001" cy="461665"/>
           </a:xfrm>
           <a:prstGeom prst="rect">
@@ -7255,16 +6117,78 @@
           </a:p>
         </p:txBody>
       </p:sp>
+      <p:sp>
+        <p:nvSpPr>
+          <p:cNvPr id="119" name="TextBox 118"/>
+          <p:cNvSpPr txBox="1"/>
+          <p:nvPr/>
+        </p:nvSpPr>
+        <p:spPr>
+          <a:xfrm>
+            <a:off x="3995936" y="1052736"/>
+            <a:ext cx="1103700" cy="276999"/>
+          </a:xfrm>
+          <a:prstGeom prst="rect">
+            <a:avLst/>
+          </a:prstGeom>
+          <a:noFill/>
+        </p:spPr>
+        <p:txBody>
+          <a:bodyPr wrap="none" rtlCol="0">
+            <a:spAutoFit/>
+          </a:bodyPr>
+          <a:lstStyle/>
+          <a:p>
+            <a:r>
+              <a:rPr lang="en-IN" sz="1200" dirty="0" smtClean="0"/>
+              <a:t>Provide details</a:t>
+            </a:r>
+            <a:endParaRPr lang="en-IN" sz="1200" dirty="0"/>
+          </a:p>
+        </p:txBody>
+      </p:sp>
+      <p:sp>
+        <p:nvSpPr>
+          <p:cNvPr id="123" name="TextBox 122"/>
+          <p:cNvSpPr txBox="1"/>
+          <p:nvPr/>
+        </p:nvSpPr>
+        <p:spPr>
+          <a:xfrm>
+            <a:off x="2843808" y="332656"/>
+            <a:ext cx="856004" cy="276999"/>
+          </a:xfrm>
+          <a:prstGeom prst="rect">
+            <a:avLst/>
+          </a:prstGeom>
+          <a:noFill/>
+        </p:spPr>
+        <p:txBody>
+          <a:bodyPr wrap="none" rtlCol="0">
+            <a:spAutoFit/>
+          </a:bodyPr>
+          <a:lstStyle/>
+          <a:p>
+            <a:r>
+              <a:rPr lang="en-IN" sz="1200" dirty="0" smtClean="0"/>
+              <a:t>Get details</a:t>
+            </a:r>
+            <a:endParaRPr lang="en-IN" sz="1200" dirty="0"/>
+          </a:p>
+        </p:txBody>
+      </p:sp>
       <p:cxnSp>
         <p:nvCxnSpPr>
-          <p:cNvPr id="116" name="Straight Arrow Connector 115"/>
-          <p:cNvCxnSpPr/>
+          <p:cNvPr id="144" name="Straight Arrow Connector 143"/>
+          <p:cNvCxnSpPr>
+            <a:stCxn id="45" idx="0"/>
+          </p:cNvCxnSpPr>
           <p:nvPr/>
         </p:nvCxnSpPr>
         <p:spPr>
-          <a:xfrm>
-            <a:off x="1187624" y="908720"/>
-            <a:ext cx="0" cy="576064"/>
+          <a:xfrm flipV="1">
+            <a:off x="1259632" y="4293097"/>
+            <a:ext cx="0" cy="360039"/>
           </a:xfrm>
           <a:prstGeom prst="straightConnector1">
             <a:avLst/>
@@ -7293,14 +6217,14 @@
       </p:cxnSp>
       <p:sp>
         <p:nvSpPr>
-          <p:cNvPr id="119" name="TextBox 118"/>
+          <p:cNvPr id="158" name="TextBox 157"/>
           <p:cNvSpPr txBox="1"/>
           <p:nvPr/>
         </p:nvSpPr>
         <p:spPr>
           <a:xfrm>
-            <a:off x="5220072" y="775737"/>
-            <a:ext cx="1103700" cy="276999"/>
+            <a:off x="1188355" y="5775647"/>
+            <a:ext cx="1727461" cy="461665"/>
           </a:xfrm>
           <a:prstGeom prst="rect">
             <a:avLst/>
@@ -7314,8 +6238,14 @@
           <a:lstStyle/>
           <a:p>
             <a:r>
-              <a:rPr lang="en-IN" sz="1200" dirty="0" smtClean="0"/>
-              <a:t>Provide details</a:t>
+              <a:rPr lang="en-US" sz="1200" dirty="0" smtClean="0"/>
+              <a:t>User and authentication </a:t>
+            </a:r>
+          </a:p>
+          <a:p>
+            <a:r>
+              <a:rPr lang="en-US" sz="1200" dirty="0" smtClean="0"/>
+              <a:t>details</a:t>
             </a:r>
             <a:endParaRPr lang="en-IN" sz="1200" dirty="0"/>
           </a:p>
@@ -7323,14 +6253,14 @@
       </p:sp>
       <p:sp>
         <p:nvSpPr>
-          <p:cNvPr id="123" name="TextBox 122"/>
+          <p:cNvPr id="159" name="TextBox 158"/>
           <p:cNvSpPr txBox="1"/>
           <p:nvPr/>
         </p:nvSpPr>
         <p:spPr>
           <a:xfrm>
-            <a:off x="4292060" y="35332"/>
-            <a:ext cx="856004" cy="276999"/>
+            <a:off x="141886" y="4293096"/>
+            <a:ext cx="901722" cy="461665"/>
           </a:xfrm>
           <a:prstGeom prst="rect">
             <a:avLst/>
@@ -7344,8 +6274,14 @@
           <a:lstStyle/>
           <a:p>
             <a:r>
-              <a:rPr lang="en-IN" sz="1200" dirty="0" smtClean="0"/>
-              <a:t>Get details</a:t>
+              <a:rPr lang="en-US" sz="1200" dirty="0" smtClean="0"/>
+              <a:t>Provide </a:t>
+            </a:r>
+          </a:p>
+          <a:p>
+            <a:r>
+              <a:rPr lang="en-US" sz="1200" dirty="0" smtClean="0"/>
+              <a:t>user details</a:t>
             </a:r>
             <a:endParaRPr lang="en-IN" sz="1200" dirty="0"/>
           </a:p>
@@ -7353,14 +6289,14 @@
       </p:sp>
       <p:sp>
         <p:nvSpPr>
-          <p:cNvPr id="136" name="TextBox 135"/>
+          <p:cNvPr id="160" name="TextBox 159"/>
           <p:cNvSpPr txBox="1"/>
           <p:nvPr/>
         </p:nvSpPr>
         <p:spPr>
           <a:xfrm>
-            <a:off x="2863190" y="5589240"/>
-            <a:ext cx="1132746" cy="646331"/>
+            <a:off x="1259632" y="4293096"/>
+            <a:ext cx="1187056" cy="276999"/>
           </a:xfrm>
           <a:prstGeom prst="rect">
             <a:avLst/>
@@ -7375,34 +6311,21 @@
           <a:p>
             <a:r>
               <a:rPr lang="en-US" sz="1200" dirty="0" smtClean="0"/>
-              <a:t>Admin and </a:t>
-            </a:r>
-          </a:p>
-          <a:p>
-            <a:r>
-              <a:rPr lang="en-US" sz="1200" dirty="0" smtClean="0"/>
-              <a:t>authentication </a:t>
-            </a:r>
-          </a:p>
-          <a:p>
-            <a:r>
-              <a:rPr lang="en-US" sz="1200" dirty="0" smtClean="0"/>
-              <a:t>details</a:t>
-            </a:r>
-            <a:endParaRPr lang="en-IN" sz="1200" dirty="0"/>
-          </a:p>
-        </p:txBody>
-      </p:sp>
-      <p:sp>
-        <p:nvSpPr>
-          <p:cNvPr id="139" name="TextBox 138"/>
+              <a:t>Add user details</a:t>
+            </a:r>
+          </a:p>
+        </p:txBody>
+      </p:sp>
+      <p:sp>
+        <p:nvSpPr>
+          <p:cNvPr id="161" name="TextBox 160"/>
           <p:cNvSpPr txBox="1"/>
           <p:nvPr/>
         </p:nvSpPr>
         <p:spPr>
           <a:xfrm>
-            <a:off x="3956702" y="4221088"/>
-            <a:ext cx="543290" cy="646331"/>
+            <a:off x="2627784" y="3501008"/>
+            <a:ext cx="741165" cy="461665"/>
           </a:xfrm>
           <a:prstGeom prst="rect">
             <a:avLst/>
@@ -7417,13 +6340,7 @@
           <a:p>
             <a:r>
               <a:rPr lang="en-US" sz="1200" dirty="0" smtClean="0"/>
-              <a:t>Grant</a:t>
-            </a:r>
-          </a:p>
-          <a:p>
-            <a:r>
-              <a:rPr lang="en-US" sz="1200" dirty="0" smtClean="0"/>
-              <a:t>Or </a:t>
+              <a:t>Grant or </a:t>
             </a:r>
           </a:p>
           <a:p>
@@ -7431,20 +6348,19 @@
               <a:rPr lang="en-US" sz="1200" dirty="0" smtClean="0"/>
               <a:t>reject</a:t>
             </a:r>
-            <a:endParaRPr lang="en-IN" sz="1200" dirty="0"/>
-          </a:p>
-        </p:txBody>
-      </p:sp>
-      <p:sp>
-        <p:nvSpPr>
-          <p:cNvPr id="141" name="TextBox 140"/>
+          </a:p>
+        </p:txBody>
+      </p:sp>
+      <p:sp>
+        <p:nvSpPr>
+          <p:cNvPr id="162" name="TextBox 161"/>
           <p:cNvSpPr txBox="1"/>
           <p:nvPr/>
         </p:nvSpPr>
         <p:spPr>
           <a:xfrm>
-            <a:off x="4644008" y="4221088"/>
-            <a:ext cx="689612" cy="646331"/>
+            <a:off x="3491880" y="4437112"/>
+            <a:ext cx="848822" cy="1015663"/>
           </a:xfrm>
           <a:prstGeom prst="rect">
             <a:avLst/>
@@ -7465,7 +6381,7 @@
           <a:p>
             <a:r>
               <a:rPr lang="en-US" sz="1200" dirty="0" err="1" smtClean="0"/>
-              <a:t>Authen</a:t>
+              <a:t>Authent</a:t>
             </a:r>
             <a:r>
               <a:rPr lang="en-US" sz="1200" dirty="0" smtClean="0"/>
@@ -7475,7 +6391,472 @@
           <a:p>
             <a:r>
               <a:rPr lang="en-US" sz="1200" dirty="0" err="1" smtClean="0"/>
-              <a:t>tication</a:t>
+              <a:t>ication</a:t>
+            </a:r>
+            <a:r>
+              <a:rPr lang="en-US" sz="1200" dirty="0" smtClean="0"/>
+              <a:t>, </a:t>
+            </a:r>
+          </a:p>
+          <a:p>
+            <a:r>
+              <a:rPr lang="en-US" sz="1200" dirty="0" smtClean="0"/>
+              <a:t>provide </a:t>
+            </a:r>
+          </a:p>
+          <a:p>
+            <a:r>
+              <a:rPr lang="en-US" sz="1200" dirty="0" smtClean="0"/>
+              <a:t>File details</a:t>
+            </a:r>
+          </a:p>
+        </p:txBody>
+      </p:sp>
+      <p:sp>
+        <p:nvSpPr>
+          <p:cNvPr id="164" name="TextBox 163"/>
+          <p:cNvSpPr txBox="1"/>
+          <p:nvPr/>
+        </p:nvSpPr>
+        <p:spPr>
+          <a:xfrm>
+            <a:off x="5153659" y="2204864"/>
+            <a:ext cx="1074525" cy="461665"/>
+          </a:xfrm>
+          <a:prstGeom prst="rect">
+            <a:avLst/>
+          </a:prstGeom>
+          <a:noFill/>
+        </p:spPr>
+        <p:txBody>
+          <a:bodyPr wrap="none" rtlCol="0">
+            <a:spAutoFit/>
+          </a:bodyPr>
+          <a:lstStyle/>
+          <a:p>
+            <a:r>
+              <a:rPr lang="en-US" sz="1200" dirty="0" smtClean="0"/>
+              <a:t>Gather all the </a:t>
+            </a:r>
+          </a:p>
+          <a:p>
+            <a:r>
+              <a:rPr lang="en-US" sz="1200" dirty="0" smtClean="0"/>
+              <a:t>file </a:t>
+            </a:r>
+            <a:r>
+              <a:rPr lang="en-US" sz="1200" dirty="0" smtClean="0"/>
+              <a:t>data</a:t>
+            </a:r>
+            <a:endParaRPr lang="en-IN" sz="1200" dirty="0"/>
+          </a:p>
+        </p:txBody>
+      </p:sp>
+      <p:sp>
+        <p:nvSpPr>
+          <p:cNvPr id="165" name="TextBox 164"/>
+          <p:cNvSpPr txBox="1"/>
+          <p:nvPr/>
+        </p:nvSpPr>
+        <p:spPr>
+          <a:xfrm>
+            <a:off x="5508104" y="2708920"/>
+            <a:ext cx="1151277" cy="461665"/>
+          </a:xfrm>
+          <a:prstGeom prst="rect">
+            <a:avLst/>
+          </a:prstGeom>
+          <a:noFill/>
+        </p:spPr>
+        <p:txBody>
+          <a:bodyPr wrap="none" rtlCol="0">
+            <a:spAutoFit/>
+          </a:bodyPr>
+          <a:lstStyle/>
+          <a:p>
+            <a:r>
+              <a:rPr lang="en-US" sz="1200" dirty="0" smtClean="0"/>
+              <a:t>Provide all the </a:t>
+            </a:r>
+          </a:p>
+          <a:p>
+            <a:r>
+              <a:rPr lang="en-US" sz="1200" dirty="0" smtClean="0"/>
+              <a:t>file </a:t>
+            </a:r>
+            <a:r>
+              <a:rPr lang="en-US" sz="1200" dirty="0" smtClean="0"/>
+              <a:t>data</a:t>
+            </a:r>
+            <a:endParaRPr lang="en-IN" sz="1200" dirty="0"/>
+          </a:p>
+        </p:txBody>
+      </p:sp>
+      <p:sp>
+        <p:nvSpPr>
+          <p:cNvPr id="166" name="TextBox 165"/>
+          <p:cNvSpPr txBox="1"/>
+          <p:nvPr/>
+        </p:nvSpPr>
+        <p:spPr>
+          <a:xfrm>
+            <a:off x="6569706" y="2935977"/>
+            <a:ext cx="882614" cy="276999"/>
+          </a:xfrm>
+          <a:prstGeom prst="rect">
+            <a:avLst/>
+          </a:prstGeom>
+          <a:noFill/>
+        </p:spPr>
+        <p:txBody>
+          <a:bodyPr wrap="none" rtlCol="0">
+            <a:spAutoFit/>
+          </a:bodyPr>
+          <a:lstStyle/>
+          <a:p>
+            <a:r>
+              <a:rPr lang="en-US" sz="1200" dirty="0" smtClean="0"/>
+              <a:t>User’s data</a:t>
+            </a:r>
+            <a:endParaRPr lang="en-IN" sz="1200" dirty="0"/>
+          </a:p>
+        </p:txBody>
+      </p:sp>
+      <p:sp>
+        <p:nvSpPr>
+          <p:cNvPr id="184" name="TextBox 183"/>
+          <p:cNvSpPr txBox="1"/>
+          <p:nvPr/>
+        </p:nvSpPr>
+        <p:spPr>
+          <a:xfrm>
+            <a:off x="5868144" y="5733256"/>
+            <a:ext cx="692818" cy="646331"/>
+          </a:xfrm>
+          <a:prstGeom prst="rect">
+            <a:avLst/>
+          </a:prstGeom>
+          <a:noFill/>
+        </p:spPr>
+        <p:txBody>
+          <a:bodyPr wrap="none" rtlCol="0">
+            <a:spAutoFit/>
+          </a:bodyPr>
+          <a:lstStyle/>
+          <a:p>
+            <a:r>
+              <a:rPr lang="en-US" sz="1200" dirty="0" smtClean="0"/>
+              <a:t>Provide </a:t>
+            </a:r>
+          </a:p>
+          <a:p>
+            <a:r>
+              <a:rPr lang="en-US" sz="1200" dirty="0" smtClean="0"/>
+              <a:t>File</a:t>
+            </a:r>
+            <a:endParaRPr lang="en-US" sz="1200" dirty="0" smtClean="0"/>
+          </a:p>
+          <a:p>
+            <a:r>
+              <a:rPr lang="en-US" sz="1200" dirty="0" smtClean="0"/>
+              <a:t>details</a:t>
+            </a:r>
+          </a:p>
+        </p:txBody>
+      </p:sp>
+      <p:sp>
+        <p:nvSpPr>
+          <p:cNvPr id="185" name="TextBox 184"/>
+          <p:cNvSpPr txBox="1"/>
+          <p:nvPr/>
+        </p:nvSpPr>
+        <p:spPr>
+          <a:xfrm>
+            <a:off x="5436096" y="3789040"/>
+            <a:ext cx="872355" cy="461665"/>
+          </a:xfrm>
+          <a:prstGeom prst="rect">
+            <a:avLst/>
+          </a:prstGeom>
+          <a:noFill/>
+        </p:spPr>
+        <p:txBody>
+          <a:bodyPr wrap="none" rtlCol="0">
+            <a:spAutoFit/>
+          </a:bodyPr>
+          <a:lstStyle/>
+          <a:p>
+            <a:r>
+              <a:rPr lang="en-US" sz="1200" dirty="0" smtClean="0"/>
+              <a:t>Provide all </a:t>
+            </a:r>
+          </a:p>
+          <a:p>
+            <a:r>
+              <a:rPr lang="en-US" sz="1200" dirty="0" smtClean="0"/>
+              <a:t>File Info</a:t>
+            </a:r>
+            <a:endParaRPr lang="en-IN" sz="1200" dirty="0"/>
+          </a:p>
+        </p:txBody>
+      </p:sp>
+      <p:sp>
+        <p:nvSpPr>
+          <p:cNvPr id="186" name="TextBox 185"/>
+          <p:cNvSpPr txBox="1"/>
+          <p:nvPr/>
+        </p:nvSpPr>
+        <p:spPr>
+          <a:xfrm>
+            <a:off x="4716016" y="4581128"/>
+            <a:ext cx="654346" cy="646331"/>
+          </a:xfrm>
+          <a:prstGeom prst="rect">
+            <a:avLst/>
+          </a:prstGeom>
+          <a:noFill/>
+        </p:spPr>
+        <p:txBody>
+          <a:bodyPr wrap="none" rtlCol="0">
+            <a:spAutoFit/>
+          </a:bodyPr>
+          <a:lstStyle/>
+          <a:p>
+            <a:r>
+              <a:rPr lang="en-US" sz="1200" dirty="0" smtClean="0"/>
+              <a:t>Ask for </a:t>
+            </a:r>
+          </a:p>
+          <a:p>
+            <a:r>
+              <a:rPr lang="en-US" sz="1200" dirty="0" smtClean="0"/>
+              <a:t>file</a:t>
+            </a:r>
+          </a:p>
+          <a:p>
+            <a:r>
+              <a:rPr lang="en-US" sz="1200" dirty="0" smtClean="0"/>
+              <a:t>Info</a:t>
+            </a:r>
+            <a:endParaRPr lang="en-IN" sz="1200" dirty="0"/>
+          </a:p>
+        </p:txBody>
+      </p:sp>
+      <p:sp>
+        <p:nvSpPr>
+          <p:cNvPr id="191" name="TextBox 190"/>
+          <p:cNvSpPr txBox="1"/>
+          <p:nvPr/>
+        </p:nvSpPr>
+        <p:spPr>
+          <a:xfrm>
+            <a:off x="3995936" y="1844824"/>
+            <a:ext cx="654346" cy="646331"/>
+          </a:xfrm>
+          <a:prstGeom prst="rect">
+            <a:avLst/>
+          </a:prstGeom>
+          <a:noFill/>
+        </p:spPr>
+        <p:txBody>
+          <a:bodyPr wrap="none" rtlCol="0">
+            <a:spAutoFit/>
+          </a:bodyPr>
+          <a:lstStyle/>
+          <a:p>
+            <a:r>
+              <a:rPr lang="en-IN" sz="1200" dirty="0" smtClean="0"/>
+              <a:t> Ask for</a:t>
+            </a:r>
+          </a:p>
+          <a:p>
+            <a:r>
+              <a:rPr lang="en-IN" sz="1200" dirty="0" smtClean="0"/>
+              <a:t> file </a:t>
+            </a:r>
+          </a:p>
+          <a:p>
+            <a:r>
+              <a:rPr lang="en-IN" sz="1200" dirty="0" smtClean="0"/>
+              <a:t> details</a:t>
+            </a:r>
+            <a:endParaRPr lang="en-IN" sz="1200" dirty="0"/>
+          </a:p>
+        </p:txBody>
+      </p:sp>
+      <p:sp>
+        <p:nvSpPr>
+          <p:cNvPr id="196" name="TextBox 195"/>
+          <p:cNvSpPr txBox="1"/>
+          <p:nvPr/>
+        </p:nvSpPr>
+        <p:spPr>
+          <a:xfrm>
+            <a:off x="2915816" y="2564904"/>
+            <a:ext cx="860044" cy="461665"/>
+          </a:xfrm>
+          <a:prstGeom prst="rect">
+            <a:avLst/>
+          </a:prstGeom>
+          <a:noFill/>
+        </p:spPr>
+        <p:txBody>
+          <a:bodyPr wrap="none" rtlCol="0">
+            <a:spAutoFit/>
+          </a:bodyPr>
+          <a:lstStyle/>
+          <a:p>
+            <a:r>
+              <a:rPr lang="en-IN" sz="1200" dirty="0" smtClean="0"/>
+              <a:t> Provide</a:t>
+            </a:r>
+          </a:p>
+          <a:p>
+            <a:r>
+              <a:rPr lang="en-IN" sz="1200" dirty="0" smtClean="0"/>
+              <a:t> file details</a:t>
+            </a:r>
+            <a:endParaRPr lang="en-IN" sz="1200" dirty="0"/>
+          </a:p>
+        </p:txBody>
+      </p:sp>
+      <p:sp>
+        <p:nvSpPr>
+          <p:cNvPr id="198" name="TextBox 197"/>
+          <p:cNvSpPr txBox="1"/>
+          <p:nvPr/>
+        </p:nvSpPr>
+        <p:spPr>
+          <a:xfrm>
+            <a:off x="8172400" y="1916832"/>
+            <a:ext cx="886781" cy="461665"/>
+          </a:xfrm>
+          <a:prstGeom prst="rect">
+            <a:avLst/>
+          </a:prstGeom>
+          <a:noFill/>
+        </p:spPr>
+        <p:txBody>
+          <a:bodyPr wrap="none" rtlCol="0">
+            <a:spAutoFit/>
+          </a:bodyPr>
+          <a:lstStyle/>
+          <a:p>
+            <a:r>
+              <a:rPr lang="en-IN" sz="1200" dirty="0" smtClean="0"/>
+              <a:t>Provide file</a:t>
+            </a:r>
+          </a:p>
+          <a:p>
+            <a:r>
+              <a:rPr lang="en-IN" sz="1200" dirty="0" smtClean="0"/>
+              <a:t>details</a:t>
+            </a:r>
+            <a:endParaRPr lang="en-IN" sz="1200" dirty="0"/>
+          </a:p>
+        </p:txBody>
+      </p:sp>
+      <p:sp>
+        <p:nvSpPr>
+          <p:cNvPr id="199" name="TextBox 198"/>
+          <p:cNvSpPr txBox="1"/>
+          <p:nvPr/>
+        </p:nvSpPr>
+        <p:spPr>
+          <a:xfrm>
+            <a:off x="5868144" y="1340768"/>
+            <a:ext cx="639086" cy="461665"/>
+          </a:xfrm>
+          <a:prstGeom prst="rect">
+            <a:avLst/>
+          </a:prstGeom>
+          <a:noFill/>
+        </p:spPr>
+        <p:txBody>
+          <a:bodyPr wrap="none" rtlCol="0">
+            <a:spAutoFit/>
+          </a:bodyPr>
+          <a:lstStyle/>
+          <a:p>
+            <a:r>
+              <a:rPr lang="en-IN" sz="1200" dirty="0" smtClean="0"/>
+              <a:t>Get file</a:t>
+            </a:r>
+          </a:p>
+          <a:p>
+            <a:r>
+              <a:rPr lang="en-IN" sz="1200" dirty="0" smtClean="0"/>
+              <a:t>details</a:t>
+            </a:r>
+            <a:endParaRPr lang="en-IN" sz="1200" dirty="0"/>
+          </a:p>
+        </p:txBody>
+      </p:sp>
+      <p:sp>
+        <p:nvSpPr>
+          <p:cNvPr id="214" name="TextBox 213"/>
+          <p:cNvSpPr txBox="1"/>
+          <p:nvPr/>
+        </p:nvSpPr>
+        <p:spPr>
+          <a:xfrm>
+            <a:off x="8526548" y="4077072"/>
+            <a:ext cx="437940" cy="461665"/>
+          </a:xfrm>
+          <a:prstGeom prst="rect">
+            <a:avLst/>
+          </a:prstGeom>
+          <a:noFill/>
+        </p:spPr>
+        <p:txBody>
+          <a:bodyPr wrap="none" rtlCol="0">
+            <a:spAutoFit/>
+          </a:bodyPr>
+          <a:lstStyle/>
+          <a:p>
+            <a:r>
+              <a:rPr lang="en-US" sz="1200" dirty="0" smtClean="0"/>
+              <a:t>File </a:t>
+            </a:r>
+          </a:p>
+          <a:p>
+            <a:r>
+              <a:rPr lang="en-US" sz="1200" dirty="0" smtClean="0"/>
+              <a:t>info</a:t>
+            </a:r>
+            <a:endParaRPr lang="en-IN" sz="1200" dirty="0"/>
+          </a:p>
+        </p:txBody>
+      </p:sp>
+      <p:sp>
+        <p:nvSpPr>
+          <p:cNvPr id="215" name="TextBox 214"/>
+          <p:cNvSpPr txBox="1"/>
+          <p:nvPr/>
+        </p:nvSpPr>
+        <p:spPr>
+          <a:xfrm>
+            <a:off x="6454807" y="4160113"/>
+            <a:ext cx="1285545" cy="276999"/>
+          </a:xfrm>
+          <a:prstGeom prst="rect">
+            <a:avLst/>
+          </a:prstGeom>
+          <a:noFill/>
+        </p:spPr>
+        <p:txBody>
+          <a:bodyPr wrap="none" rtlCol="0">
+            <a:spAutoFit/>
+          </a:bodyPr>
+          <a:lstStyle/>
+          <a:p>
+            <a:r>
+              <a:rPr lang="en-US" sz="1200" dirty="0" smtClean="0"/>
+              <a:t>User’s File </a:t>
+            </a:r>
+            <a:r>
+              <a:rPr lang="en-US" sz="1200" dirty="0" smtClean="0"/>
+              <a:t>Details</a:t>
             </a:r>
             <a:endParaRPr lang="en-IN" sz="1200" dirty="0"/>
           </a:p>
@@ -7483,19 +6864,19 @@
       </p:sp>
       <p:cxnSp>
         <p:nvCxnSpPr>
-          <p:cNvPr id="144" name="Straight Arrow Connector 143"/>
-          <p:cNvCxnSpPr>
-            <a:stCxn id="45" idx="0"/>
-          </p:cNvCxnSpPr>
+          <p:cNvPr id="130" name="Elbow Connector 139"/>
+          <p:cNvCxnSpPr/>
           <p:nvPr/>
         </p:nvCxnSpPr>
         <p:spPr>
-          <a:xfrm flipV="1">
-            <a:off x="1259632" y="4293097"/>
-            <a:ext cx="0" cy="360039"/>
-          </a:xfrm>
-          <a:prstGeom prst="straightConnector1">
-            <a:avLst/>
+          <a:xfrm>
+            <a:off x="2195736" y="1916832"/>
+            <a:ext cx="1656184" cy="1152128"/>
+          </a:xfrm>
+          <a:prstGeom prst="bentConnector3">
+            <a:avLst>
+              <a:gd name="adj1" fmla="val 50000"/>
+            </a:avLst>
           </a:prstGeom>
           <a:ln>
             <a:solidFill>
@@ -7519,920 +6900,44 @@
           </a:fontRef>
         </p:style>
       </p:cxnSp>
-      <p:sp>
-        <p:nvSpPr>
-          <p:cNvPr id="149" name="TextBox 148"/>
-          <p:cNvSpPr txBox="1"/>
-          <p:nvPr/>
-        </p:nvSpPr>
+      <p:cxnSp>
+        <p:nvCxnSpPr>
+          <p:cNvPr id="145" name="Elbow Connector 139"/>
+          <p:cNvCxnSpPr>
+            <a:stCxn id="67" idx="0"/>
+          </p:cNvCxnSpPr>
+          <p:nvPr/>
+        </p:nvCxnSpPr>
         <p:spPr>
-          <a:xfrm>
-            <a:off x="4067944" y="6453336"/>
-            <a:ext cx="1531701" cy="276999"/>
-          </a:xfrm>
-          <a:prstGeom prst="rect">
+          <a:xfrm rot="16200000" flipV="1">
+            <a:off x="3041830" y="1286762"/>
+            <a:ext cx="1368152" cy="1764196"/>
+          </a:xfrm>
+          <a:prstGeom prst="bentConnector2">
             <a:avLst/>
           </a:prstGeom>
-          <a:noFill/>
-        </p:spPr>
-        <p:txBody>
-          <a:bodyPr wrap="none" rtlCol="0">
-            <a:spAutoFit/>
-          </a:bodyPr>
-          <a:lstStyle/>
-          <a:p>
-            <a:r>
-              <a:rPr lang="en-US" sz="1200" dirty="0" smtClean="0"/>
-              <a:t>Provide admin details</a:t>
-            </a:r>
-            <a:endParaRPr lang="en-IN" sz="1200" dirty="0"/>
-          </a:p>
-        </p:txBody>
-      </p:sp>
-      <p:sp>
-        <p:nvSpPr>
-          <p:cNvPr id="151" name="TextBox 150"/>
-          <p:cNvSpPr txBox="1"/>
-          <p:nvPr/>
-        </p:nvSpPr>
-        <p:spPr>
-          <a:xfrm>
-            <a:off x="5580112" y="5445224"/>
-            <a:ext cx="612668" cy="646331"/>
-          </a:xfrm>
-          <a:prstGeom prst="rect">
-            <a:avLst/>
-          </a:prstGeom>
-          <a:noFill/>
-        </p:spPr>
-        <p:txBody>
-          <a:bodyPr wrap="none" rtlCol="0">
-            <a:spAutoFit/>
-          </a:bodyPr>
-          <a:lstStyle/>
-          <a:p>
-            <a:r>
-              <a:rPr lang="en-US" sz="1200" dirty="0" smtClean="0"/>
-              <a:t>Add </a:t>
-            </a:r>
-          </a:p>
-          <a:p>
-            <a:r>
-              <a:rPr lang="en-US" sz="1200" dirty="0" smtClean="0"/>
-              <a:t>admin </a:t>
-            </a:r>
-          </a:p>
-          <a:p>
-            <a:r>
-              <a:rPr lang="en-US" sz="1200" dirty="0" smtClean="0"/>
-              <a:t>details</a:t>
-            </a:r>
-          </a:p>
-        </p:txBody>
-      </p:sp>
-      <p:sp>
-        <p:nvSpPr>
-          <p:cNvPr id="158" name="TextBox 157"/>
-          <p:cNvSpPr txBox="1"/>
-          <p:nvPr/>
-        </p:nvSpPr>
-        <p:spPr>
-          <a:xfrm>
-            <a:off x="1188355" y="5775647"/>
-            <a:ext cx="1727461" cy="461665"/>
-          </a:xfrm>
-          <a:prstGeom prst="rect">
-            <a:avLst/>
-          </a:prstGeom>
-          <a:noFill/>
-        </p:spPr>
-        <p:txBody>
-          <a:bodyPr wrap="none" rtlCol="0">
-            <a:spAutoFit/>
-          </a:bodyPr>
-          <a:lstStyle/>
-          <a:p>
-            <a:r>
-              <a:rPr lang="en-US" sz="1200" dirty="0" smtClean="0"/>
-              <a:t>User and authentication </a:t>
-            </a:r>
-          </a:p>
-          <a:p>
-            <a:r>
-              <a:rPr lang="en-US" sz="1200" dirty="0" smtClean="0"/>
-              <a:t>details</a:t>
-            </a:r>
-            <a:endParaRPr lang="en-IN" sz="1200" dirty="0"/>
-          </a:p>
-        </p:txBody>
-      </p:sp>
-      <p:sp>
-        <p:nvSpPr>
-          <p:cNvPr id="159" name="TextBox 158"/>
-          <p:cNvSpPr txBox="1"/>
-          <p:nvPr/>
-        </p:nvSpPr>
-        <p:spPr>
-          <a:xfrm>
-            <a:off x="141886" y="4293096"/>
-            <a:ext cx="901722" cy="461665"/>
-          </a:xfrm>
-          <a:prstGeom prst="rect">
-            <a:avLst/>
-          </a:prstGeom>
-          <a:noFill/>
-        </p:spPr>
-        <p:txBody>
-          <a:bodyPr wrap="none" rtlCol="0">
-            <a:spAutoFit/>
-          </a:bodyPr>
-          <a:lstStyle/>
-          <a:p>
-            <a:r>
-              <a:rPr lang="en-US" sz="1200" dirty="0" smtClean="0"/>
-              <a:t>Provide </a:t>
-            </a:r>
-          </a:p>
-          <a:p>
-            <a:r>
-              <a:rPr lang="en-US" sz="1200" dirty="0" smtClean="0"/>
-              <a:t>user details</a:t>
-            </a:r>
-            <a:endParaRPr lang="en-IN" sz="1200" dirty="0"/>
-          </a:p>
-        </p:txBody>
-      </p:sp>
-      <p:sp>
-        <p:nvSpPr>
-          <p:cNvPr id="160" name="TextBox 159"/>
-          <p:cNvSpPr txBox="1"/>
-          <p:nvPr/>
-        </p:nvSpPr>
-        <p:spPr>
-          <a:xfrm>
-            <a:off x="1259632" y="4293096"/>
-            <a:ext cx="1187056" cy="276999"/>
-          </a:xfrm>
-          <a:prstGeom prst="rect">
-            <a:avLst/>
-          </a:prstGeom>
-          <a:noFill/>
-        </p:spPr>
-        <p:txBody>
-          <a:bodyPr wrap="none" rtlCol="0">
-            <a:spAutoFit/>
-          </a:bodyPr>
-          <a:lstStyle/>
-          <a:p>
-            <a:r>
-              <a:rPr lang="en-US" sz="1200" dirty="0" smtClean="0"/>
-              <a:t>Add user details</a:t>
-            </a:r>
-          </a:p>
-        </p:txBody>
-      </p:sp>
-      <p:sp>
-        <p:nvSpPr>
-          <p:cNvPr id="161" name="TextBox 160"/>
-          <p:cNvSpPr txBox="1"/>
-          <p:nvPr/>
-        </p:nvSpPr>
-        <p:spPr>
-          <a:xfrm>
-            <a:off x="2627784" y="3501008"/>
-            <a:ext cx="741165" cy="461665"/>
-          </a:xfrm>
-          <a:prstGeom prst="rect">
-            <a:avLst/>
-          </a:prstGeom>
-          <a:noFill/>
-        </p:spPr>
-        <p:txBody>
-          <a:bodyPr wrap="none" rtlCol="0">
-            <a:spAutoFit/>
-          </a:bodyPr>
-          <a:lstStyle/>
-          <a:p>
-            <a:r>
-              <a:rPr lang="en-US" sz="1200" dirty="0" smtClean="0"/>
-              <a:t>Grant or </a:t>
-            </a:r>
-          </a:p>
-          <a:p>
-            <a:r>
-              <a:rPr lang="en-US" sz="1200" dirty="0" smtClean="0"/>
-              <a:t>reject</a:t>
-            </a:r>
-          </a:p>
-        </p:txBody>
-      </p:sp>
-      <p:sp>
-        <p:nvSpPr>
-          <p:cNvPr id="162" name="TextBox 161"/>
-          <p:cNvSpPr txBox="1"/>
-          <p:nvPr/>
-        </p:nvSpPr>
-        <p:spPr>
-          <a:xfrm>
-            <a:off x="2771800" y="4429561"/>
-            <a:ext cx="848822" cy="1015663"/>
-          </a:xfrm>
-          <a:prstGeom prst="rect">
-            <a:avLst/>
-          </a:prstGeom>
-          <a:noFill/>
-        </p:spPr>
-        <p:txBody>
-          <a:bodyPr wrap="none" rtlCol="0">
-            <a:spAutoFit/>
-          </a:bodyPr>
-          <a:lstStyle/>
-          <a:p>
-            <a:r>
-              <a:rPr lang="en-US" sz="1200" dirty="0" smtClean="0"/>
-              <a:t>Ask for </a:t>
-            </a:r>
-          </a:p>
-          <a:p>
-            <a:r>
-              <a:rPr lang="en-US" sz="1200" dirty="0" err="1" smtClean="0"/>
-              <a:t>Authent</a:t>
-            </a:r>
-            <a:r>
-              <a:rPr lang="en-US" sz="1200" dirty="0" smtClean="0"/>
-              <a:t>-</a:t>
-            </a:r>
-          </a:p>
-          <a:p>
-            <a:r>
-              <a:rPr lang="en-US" sz="1200" dirty="0" err="1" smtClean="0"/>
-              <a:t>ication</a:t>
-            </a:r>
-            <a:r>
-              <a:rPr lang="en-US" sz="1200" dirty="0" smtClean="0"/>
-              <a:t>, </a:t>
-            </a:r>
-          </a:p>
-          <a:p>
-            <a:r>
-              <a:rPr lang="en-US" sz="1200" dirty="0" smtClean="0"/>
-              <a:t>provide </a:t>
-            </a:r>
-          </a:p>
-          <a:p>
-            <a:r>
-              <a:rPr lang="en-US" sz="1200" dirty="0" smtClean="0"/>
-              <a:t>File details</a:t>
-            </a:r>
-          </a:p>
-        </p:txBody>
-      </p:sp>
-      <p:sp>
-        <p:nvSpPr>
-          <p:cNvPr id="164" name="TextBox 163"/>
-          <p:cNvSpPr txBox="1"/>
-          <p:nvPr/>
-        </p:nvSpPr>
-        <p:spPr>
-          <a:xfrm>
-            <a:off x="5153659" y="2204864"/>
-            <a:ext cx="1074525" cy="461665"/>
-          </a:xfrm>
-          <a:prstGeom prst="rect">
-            <a:avLst/>
-          </a:prstGeom>
-          <a:noFill/>
-        </p:spPr>
-        <p:txBody>
-          <a:bodyPr wrap="none" rtlCol="0">
-            <a:spAutoFit/>
-          </a:bodyPr>
-          <a:lstStyle/>
-          <a:p>
-            <a:r>
-              <a:rPr lang="en-US" sz="1200" dirty="0" smtClean="0"/>
-              <a:t>Gather all the </a:t>
-            </a:r>
-          </a:p>
-          <a:p>
-            <a:r>
-              <a:rPr lang="en-US" sz="1200" dirty="0" smtClean="0"/>
-              <a:t>user’s data</a:t>
-            </a:r>
-            <a:endParaRPr lang="en-IN" sz="1200" dirty="0"/>
-          </a:p>
-        </p:txBody>
-      </p:sp>
-      <p:sp>
-        <p:nvSpPr>
-          <p:cNvPr id="165" name="TextBox 164"/>
-          <p:cNvSpPr txBox="1"/>
-          <p:nvPr/>
-        </p:nvSpPr>
-        <p:spPr>
-          <a:xfrm>
-            <a:off x="5508104" y="2708920"/>
-            <a:ext cx="1151277" cy="461665"/>
-          </a:xfrm>
-          <a:prstGeom prst="rect">
-            <a:avLst/>
-          </a:prstGeom>
-          <a:noFill/>
-        </p:spPr>
-        <p:txBody>
-          <a:bodyPr wrap="none" rtlCol="0">
-            <a:spAutoFit/>
-          </a:bodyPr>
-          <a:lstStyle/>
-          <a:p>
-            <a:r>
-              <a:rPr lang="en-US" sz="1200" dirty="0" smtClean="0"/>
-              <a:t>Provide all the </a:t>
-            </a:r>
-          </a:p>
-          <a:p>
-            <a:r>
-              <a:rPr lang="en-US" sz="1200" dirty="0" smtClean="0"/>
-              <a:t>user’s data</a:t>
-            </a:r>
-            <a:endParaRPr lang="en-IN" sz="1200" dirty="0"/>
-          </a:p>
-        </p:txBody>
-      </p:sp>
-      <p:sp>
-        <p:nvSpPr>
-          <p:cNvPr id="166" name="TextBox 165"/>
-          <p:cNvSpPr txBox="1"/>
-          <p:nvPr/>
-        </p:nvSpPr>
-        <p:spPr>
-          <a:xfrm>
-            <a:off x="6569706" y="2935977"/>
-            <a:ext cx="882614" cy="276999"/>
-          </a:xfrm>
-          <a:prstGeom prst="rect">
-            <a:avLst/>
-          </a:prstGeom>
-          <a:noFill/>
-        </p:spPr>
-        <p:txBody>
-          <a:bodyPr wrap="none" rtlCol="0">
-            <a:spAutoFit/>
-          </a:bodyPr>
-          <a:lstStyle/>
-          <a:p>
-            <a:r>
-              <a:rPr lang="en-US" sz="1200" dirty="0" smtClean="0"/>
-              <a:t>User’s data</a:t>
-            </a:r>
-            <a:endParaRPr lang="en-IN" sz="1200" dirty="0"/>
-          </a:p>
-        </p:txBody>
-      </p:sp>
-      <p:sp>
-        <p:nvSpPr>
-          <p:cNvPr id="184" name="TextBox 183"/>
-          <p:cNvSpPr txBox="1"/>
-          <p:nvPr/>
-        </p:nvSpPr>
-        <p:spPr>
-          <a:xfrm>
-            <a:off x="6444208" y="5229200"/>
-            <a:ext cx="692818" cy="830997"/>
-          </a:xfrm>
-          <a:prstGeom prst="rect">
-            <a:avLst/>
-          </a:prstGeom>
-          <a:noFill/>
-        </p:spPr>
-        <p:txBody>
-          <a:bodyPr wrap="none" rtlCol="0">
-            <a:spAutoFit/>
-          </a:bodyPr>
-          <a:lstStyle/>
-          <a:p>
-            <a:r>
-              <a:rPr lang="en-US" sz="1200" dirty="0" smtClean="0"/>
-              <a:t>Provide </a:t>
-            </a:r>
-          </a:p>
-          <a:p>
-            <a:r>
-              <a:rPr lang="en-US" sz="1200" dirty="0" smtClean="0"/>
-              <a:t>user’s</a:t>
-            </a:r>
-          </a:p>
-          <a:p>
-            <a:r>
-              <a:rPr lang="en-US" sz="1200" dirty="0" smtClean="0"/>
-              <a:t>file</a:t>
-            </a:r>
-          </a:p>
-          <a:p>
-            <a:r>
-              <a:rPr lang="en-US" sz="1200" dirty="0" smtClean="0"/>
-              <a:t>details</a:t>
-            </a:r>
-          </a:p>
-        </p:txBody>
-      </p:sp>
-      <p:sp>
-        <p:nvSpPr>
-          <p:cNvPr id="185" name="TextBox 184"/>
-          <p:cNvSpPr txBox="1"/>
-          <p:nvPr/>
-        </p:nvSpPr>
-        <p:spPr>
-          <a:xfrm>
-            <a:off x="5436096" y="3789040"/>
-            <a:ext cx="872355" cy="646331"/>
-          </a:xfrm>
-          <a:prstGeom prst="rect">
-            <a:avLst/>
-          </a:prstGeom>
-          <a:noFill/>
-        </p:spPr>
-        <p:txBody>
-          <a:bodyPr wrap="none" rtlCol="0">
-            <a:spAutoFit/>
-          </a:bodyPr>
-          <a:lstStyle/>
-          <a:p>
-            <a:r>
-              <a:rPr lang="en-US" sz="1200" dirty="0" smtClean="0"/>
-              <a:t>Provide all </a:t>
-            </a:r>
-          </a:p>
-          <a:p>
-            <a:r>
-              <a:rPr lang="en-US" sz="1200" dirty="0" smtClean="0"/>
-              <a:t>The user’s</a:t>
-            </a:r>
-          </a:p>
-          <a:p>
-            <a:r>
-              <a:rPr lang="en-US" sz="1200" dirty="0" smtClean="0"/>
-              <a:t>File data</a:t>
-            </a:r>
-            <a:endParaRPr lang="en-IN" sz="1200" dirty="0"/>
-          </a:p>
-        </p:txBody>
-      </p:sp>
-      <p:sp>
-        <p:nvSpPr>
-          <p:cNvPr id="186" name="TextBox 185"/>
-          <p:cNvSpPr txBox="1"/>
-          <p:nvPr/>
-        </p:nvSpPr>
-        <p:spPr>
-          <a:xfrm>
-            <a:off x="5292080" y="4437112"/>
-            <a:ext cx="820161" cy="646331"/>
-          </a:xfrm>
-          <a:prstGeom prst="rect">
-            <a:avLst/>
-          </a:prstGeom>
-          <a:noFill/>
-        </p:spPr>
-        <p:txBody>
-          <a:bodyPr wrap="none" rtlCol="0">
-            <a:spAutoFit/>
-          </a:bodyPr>
-          <a:lstStyle/>
-          <a:p>
-            <a:r>
-              <a:rPr lang="en-US" sz="1200" dirty="0" smtClean="0"/>
-              <a:t>Get all </a:t>
-            </a:r>
-          </a:p>
-          <a:p>
-            <a:r>
-              <a:rPr lang="en-US" sz="1200" dirty="0" smtClean="0"/>
-              <a:t>The user’s</a:t>
-            </a:r>
-          </a:p>
-          <a:p>
-            <a:r>
-              <a:rPr lang="en-US" sz="1200" dirty="0" smtClean="0"/>
-              <a:t> file Info</a:t>
-            </a:r>
-            <a:endParaRPr lang="en-IN" sz="1200" dirty="0"/>
-          </a:p>
-        </p:txBody>
-      </p:sp>
-      <p:sp>
-        <p:nvSpPr>
-          <p:cNvPr id="191" name="TextBox 190"/>
-          <p:cNvSpPr txBox="1"/>
-          <p:nvPr/>
-        </p:nvSpPr>
-        <p:spPr>
-          <a:xfrm>
-            <a:off x="3635896" y="1844824"/>
-            <a:ext cx="654346" cy="646331"/>
-          </a:xfrm>
-          <a:prstGeom prst="rect">
-            <a:avLst/>
-          </a:prstGeom>
-          <a:noFill/>
-        </p:spPr>
-        <p:txBody>
-          <a:bodyPr wrap="none" rtlCol="0">
-            <a:spAutoFit/>
-          </a:bodyPr>
-          <a:lstStyle/>
-          <a:p>
-            <a:r>
-              <a:rPr lang="en-IN" sz="1200" dirty="0" smtClean="0"/>
-              <a:t> Ask for</a:t>
-            </a:r>
-          </a:p>
-          <a:p>
-            <a:r>
-              <a:rPr lang="en-IN" sz="1200" dirty="0" smtClean="0"/>
-              <a:t> file </a:t>
-            </a:r>
-          </a:p>
-          <a:p>
-            <a:r>
-              <a:rPr lang="en-IN" sz="1200" dirty="0" smtClean="0"/>
-              <a:t> details</a:t>
-            </a:r>
-            <a:endParaRPr lang="en-IN" sz="1200" dirty="0"/>
-          </a:p>
-        </p:txBody>
-      </p:sp>
-      <p:sp>
-        <p:nvSpPr>
-          <p:cNvPr id="196" name="TextBox 195"/>
-          <p:cNvSpPr txBox="1"/>
-          <p:nvPr/>
-        </p:nvSpPr>
-        <p:spPr>
-          <a:xfrm>
-            <a:off x="4720068" y="1556792"/>
-            <a:ext cx="860044" cy="461665"/>
-          </a:xfrm>
-          <a:prstGeom prst="rect">
-            <a:avLst/>
-          </a:prstGeom>
-          <a:noFill/>
-        </p:spPr>
-        <p:txBody>
-          <a:bodyPr wrap="none" rtlCol="0">
-            <a:spAutoFit/>
-          </a:bodyPr>
-          <a:lstStyle/>
-          <a:p>
-            <a:r>
-              <a:rPr lang="en-IN" sz="1200" dirty="0" smtClean="0"/>
-              <a:t> Provide</a:t>
-            </a:r>
-          </a:p>
-          <a:p>
-            <a:r>
-              <a:rPr lang="en-IN" sz="1200" dirty="0" smtClean="0"/>
-              <a:t> file details</a:t>
-            </a:r>
-            <a:endParaRPr lang="en-IN" sz="1200" dirty="0"/>
-          </a:p>
-        </p:txBody>
-      </p:sp>
-      <p:sp>
-        <p:nvSpPr>
-          <p:cNvPr id="198" name="TextBox 197"/>
-          <p:cNvSpPr txBox="1"/>
-          <p:nvPr/>
-        </p:nvSpPr>
-        <p:spPr>
-          <a:xfrm>
-            <a:off x="8172400" y="1916832"/>
-            <a:ext cx="886781" cy="461665"/>
-          </a:xfrm>
-          <a:prstGeom prst="rect">
-            <a:avLst/>
-          </a:prstGeom>
-          <a:noFill/>
-        </p:spPr>
-        <p:txBody>
-          <a:bodyPr wrap="none" rtlCol="0">
-            <a:spAutoFit/>
-          </a:bodyPr>
-          <a:lstStyle/>
-          <a:p>
-            <a:r>
-              <a:rPr lang="en-IN" sz="1200" dirty="0" smtClean="0"/>
-              <a:t>Provide file</a:t>
-            </a:r>
-          </a:p>
-          <a:p>
-            <a:r>
-              <a:rPr lang="en-IN" sz="1200" dirty="0" smtClean="0"/>
-              <a:t>details</a:t>
-            </a:r>
-            <a:endParaRPr lang="en-IN" sz="1200" dirty="0"/>
-          </a:p>
-        </p:txBody>
-      </p:sp>
-      <p:sp>
-        <p:nvSpPr>
-          <p:cNvPr id="199" name="TextBox 198"/>
-          <p:cNvSpPr txBox="1"/>
-          <p:nvPr/>
-        </p:nvSpPr>
-        <p:spPr>
-          <a:xfrm>
-            <a:off x="5868144" y="1340768"/>
-            <a:ext cx="639086" cy="461665"/>
-          </a:xfrm>
-          <a:prstGeom prst="rect">
-            <a:avLst/>
-          </a:prstGeom>
-          <a:noFill/>
-        </p:spPr>
-        <p:txBody>
-          <a:bodyPr wrap="none" rtlCol="0">
-            <a:spAutoFit/>
-          </a:bodyPr>
-          <a:lstStyle/>
-          <a:p>
-            <a:r>
-              <a:rPr lang="en-IN" sz="1200" dirty="0" smtClean="0"/>
-              <a:t>Get file</a:t>
-            </a:r>
-          </a:p>
-          <a:p>
-            <a:r>
-              <a:rPr lang="en-IN" sz="1200" dirty="0" smtClean="0"/>
-              <a:t>details</a:t>
-            </a:r>
-            <a:endParaRPr lang="en-IN" sz="1200" dirty="0"/>
-          </a:p>
-        </p:txBody>
-      </p:sp>
-      <p:sp>
-        <p:nvSpPr>
-          <p:cNvPr id="201" name="TextBox 200"/>
-          <p:cNvSpPr txBox="1"/>
-          <p:nvPr/>
-        </p:nvSpPr>
-        <p:spPr>
-          <a:xfrm>
-            <a:off x="2195736" y="2060848"/>
-            <a:ext cx="872355" cy="646331"/>
-          </a:xfrm>
-          <a:prstGeom prst="rect">
-            <a:avLst/>
-          </a:prstGeom>
-          <a:noFill/>
-        </p:spPr>
-        <p:txBody>
-          <a:bodyPr wrap="none" rtlCol="0">
-            <a:spAutoFit/>
-          </a:bodyPr>
-          <a:lstStyle/>
-          <a:p>
-            <a:r>
-              <a:rPr lang="en-US" sz="1200" dirty="0" smtClean="0"/>
-              <a:t>Provide all </a:t>
-            </a:r>
-          </a:p>
-          <a:p>
-            <a:r>
-              <a:rPr lang="en-US" sz="1200" dirty="0" smtClean="0"/>
-              <a:t>The user’s</a:t>
-            </a:r>
-          </a:p>
-          <a:p>
-            <a:r>
-              <a:rPr lang="en-US" sz="1200" dirty="0" smtClean="0"/>
-              <a:t>File data</a:t>
-            </a:r>
-            <a:endParaRPr lang="en-IN" sz="1200" dirty="0"/>
-          </a:p>
-        </p:txBody>
-      </p:sp>
-      <p:sp>
-        <p:nvSpPr>
-          <p:cNvPr id="203" name="TextBox 202"/>
-          <p:cNvSpPr txBox="1"/>
-          <p:nvPr/>
-        </p:nvSpPr>
-        <p:spPr>
-          <a:xfrm>
-            <a:off x="3059832" y="1733907"/>
-            <a:ext cx="624658" cy="830997"/>
-          </a:xfrm>
-          <a:prstGeom prst="rect">
-            <a:avLst/>
-          </a:prstGeom>
-          <a:noFill/>
-        </p:spPr>
-        <p:txBody>
-          <a:bodyPr wrap="none" rtlCol="0">
-            <a:spAutoFit/>
-          </a:bodyPr>
-          <a:lstStyle/>
-          <a:p>
-            <a:r>
-              <a:rPr lang="en-US" sz="1200" dirty="0" smtClean="0"/>
-              <a:t>Get all </a:t>
-            </a:r>
-          </a:p>
-          <a:p>
-            <a:r>
-              <a:rPr lang="en-US" sz="1200" dirty="0" smtClean="0"/>
-              <a:t>user’s</a:t>
-            </a:r>
-          </a:p>
-          <a:p>
-            <a:r>
-              <a:rPr lang="en-US" sz="1200" dirty="0" smtClean="0"/>
-              <a:t>file </a:t>
-            </a:r>
-          </a:p>
-          <a:p>
-            <a:r>
-              <a:rPr lang="en-US" sz="1200" dirty="0" smtClean="0"/>
-              <a:t>Info</a:t>
-            </a:r>
-            <a:endParaRPr lang="en-IN" sz="1200" dirty="0"/>
-          </a:p>
-        </p:txBody>
-      </p:sp>
-      <p:sp>
-        <p:nvSpPr>
-          <p:cNvPr id="212" name="TextBox 211"/>
-          <p:cNvSpPr txBox="1"/>
-          <p:nvPr/>
-        </p:nvSpPr>
-        <p:spPr>
-          <a:xfrm>
-            <a:off x="251520" y="2564904"/>
-            <a:ext cx="713593" cy="461665"/>
-          </a:xfrm>
-          <a:prstGeom prst="rect">
-            <a:avLst/>
-          </a:prstGeom>
-          <a:noFill/>
-        </p:spPr>
-        <p:txBody>
-          <a:bodyPr wrap="none" rtlCol="0">
-            <a:spAutoFit/>
-          </a:bodyPr>
-          <a:lstStyle/>
-          <a:p>
-            <a:r>
-              <a:rPr lang="en-US" sz="1200" dirty="0" smtClean="0"/>
-              <a:t>User’s</a:t>
-            </a:r>
-          </a:p>
-          <a:p>
-            <a:r>
-              <a:rPr lang="en-US" sz="1200" dirty="0" smtClean="0"/>
-              <a:t>File data</a:t>
-            </a:r>
-            <a:endParaRPr lang="en-IN" sz="1200" dirty="0"/>
-          </a:p>
-        </p:txBody>
-      </p:sp>
-      <p:sp>
-        <p:nvSpPr>
-          <p:cNvPr id="213" name="TextBox 212"/>
-          <p:cNvSpPr txBox="1"/>
-          <p:nvPr/>
-        </p:nvSpPr>
-        <p:spPr>
-          <a:xfrm>
-            <a:off x="1259632" y="2708920"/>
-            <a:ext cx="677493" cy="276999"/>
-          </a:xfrm>
-          <a:prstGeom prst="rect">
-            <a:avLst/>
-          </a:prstGeom>
-          <a:noFill/>
-        </p:spPr>
-        <p:txBody>
-          <a:bodyPr wrap="none" rtlCol="0">
-            <a:spAutoFit/>
-          </a:bodyPr>
-          <a:lstStyle/>
-          <a:p>
-            <a:r>
-              <a:rPr lang="en-US" sz="1200" dirty="0" smtClean="0"/>
-              <a:t>File info</a:t>
-            </a:r>
-            <a:endParaRPr lang="en-IN" sz="1200" dirty="0"/>
-          </a:p>
-        </p:txBody>
-      </p:sp>
-      <p:sp>
-        <p:nvSpPr>
-          <p:cNvPr id="214" name="TextBox 213"/>
-          <p:cNvSpPr txBox="1"/>
-          <p:nvPr/>
-        </p:nvSpPr>
-        <p:spPr>
-          <a:xfrm>
-            <a:off x="8706060" y="4077072"/>
-            <a:ext cx="437940" cy="461665"/>
-          </a:xfrm>
-          <a:prstGeom prst="rect">
-            <a:avLst/>
-          </a:prstGeom>
-          <a:noFill/>
-        </p:spPr>
-        <p:txBody>
-          <a:bodyPr wrap="none" rtlCol="0">
-            <a:spAutoFit/>
-          </a:bodyPr>
-          <a:lstStyle/>
-          <a:p>
-            <a:r>
-              <a:rPr lang="en-US" sz="1200" dirty="0" smtClean="0"/>
-              <a:t>File </a:t>
-            </a:r>
-          </a:p>
-          <a:p>
-            <a:r>
-              <a:rPr lang="en-US" sz="1200" dirty="0" smtClean="0"/>
-              <a:t>info</a:t>
-            </a:r>
-            <a:endParaRPr lang="en-IN" sz="1200" dirty="0"/>
-          </a:p>
-        </p:txBody>
-      </p:sp>
-      <p:sp>
-        <p:nvSpPr>
-          <p:cNvPr id="215" name="TextBox 214"/>
-          <p:cNvSpPr txBox="1"/>
-          <p:nvPr/>
-        </p:nvSpPr>
-        <p:spPr>
-          <a:xfrm>
-            <a:off x="6372200" y="3933056"/>
-            <a:ext cx="1135888" cy="276999"/>
-          </a:xfrm>
-          <a:prstGeom prst="rect">
-            <a:avLst/>
-          </a:prstGeom>
-          <a:noFill/>
-        </p:spPr>
-        <p:txBody>
-          <a:bodyPr wrap="none" rtlCol="0">
-            <a:spAutoFit/>
-          </a:bodyPr>
-          <a:lstStyle/>
-          <a:p>
-            <a:r>
-              <a:rPr lang="en-US" sz="1200" dirty="0" smtClean="0"/>
-              <a:t>User’s File data</a:t>
-            </a:r>
-            <a:endParaRPr lang="en-IN" sz="1200" dirty="0"/>
-          </a:p>
-        </p:txBody>
-      </p:sp>
-      <p:sp>
-        <p:nvSpPr>
-          <p:cNvPr id="216" name="TextBox 215"/>
-          <p:cNvSpPr txBox="1"/>
-          <p:nvPr/>
-        </p:nvSpPr>
-        <p:spPr>
-          <a:xfrm>
-            <a:off x="338802" y="910461"/>
-            <a:ext cx="848822" cy="646331"/>
-          </a:xfrm>
-          <a:prstGeom prst="rect">
-            <a:avLst/>
-          </a:prstGeom>
-          <a:noFill/>
-        </p:spPr>
-        <p:txBody>
-          <a:bodyPr wrap="none" rtlCol="0">
-            <a:spAutoFit/>
-          </a:bodyPr>
-          <a:lstStyle/>
-          <a:p>
-            <a:r>
-              <a:rPr lang="en-US" sz="1200" dirty="0" smtClean="0"/>
-              <a:t>Provide </a:t>
-            </a:r>
-          </a:p>
-          <a:p>
-            <a:r>
-              <a:rPr lang="en-US" sz="1200" dirty="0" smtClean="0"/>
-              <a:t>user’s</a:t>
-            </a:r>
-          </a:p>
-          <a:p>
-            <a:r>
-              <a:rPr lang="en-US" sz="1200" dirty="0" smtClean="0"/>
-              <a:t>File details</a:t>
-            </a:r>
-          </a:p>
-        </p:txBody>
-      </p:sp>
+          <a:ln>
+            <a:solidFill>
+              <a:schemeClr val="tx1"/>
+            </a:solidFill>
+            <a:tailEnd type="arrow"/>
+          </a:ln>
+        </p:spPr>
+        <p:style>
+          <a:lnRef idx="1">
+            <a:schemeClr val="accent1"/>
+          </a:lnRef>
+          <a:fillRef idx="0">
+            <a:schemeClr val="accent1"/>
+          </a:fillRef>
+          <a:effectRef idx="0">
+            <a:schemeClr val="accent1"/>
+          </a:effectRef>
+          <a:fontRef idx="minor">
+            <a:schemeClr val="tx1"/>
+          </a:fontRef>
+        </p:style>
+      </p:cxnSp>
     </p:spTree>
   </p:cSld>
   <p:clrMapOvr>
@@ -8486,14 +6991,14 @@
           <a:effectLst/>
           <a:extLst>
             <a:ext uri="{909E8E84-426E-40DD-AFC4-6F175D3DCCD1}">
-              <a14:hiddenFill xmlns:a14="http://schemas.microsoft.com/office/drawing/2010/main">
+              <a14:hiddenFill xmlns="" xmlns:a14="http://schemas.microsoft.com/office/drawing/2010/main">
                 <a:solidFill>
                   <a:schemeClr val="accent1"/>
                 </a:solidFill>
               </a14:hiddenFill>
             </a:ext>
             <a:ext uri="{AF507438-7753-43E0-B8FC-AC1667EBCBE1}">
-              <a14:hiddenEffects xmlns:a14="http://schemas.microsoft.com/office/drawing/2010/main">
+              <a14:hiddenEffects xmlns="" xmlns:a14="http://schemas.microsoft.com/office/drawing/2010/main">
                 <a:effectLst>
                   <a:outerShdw dist="35921" dir="2700000" algn="ctr" rotWithShape="0">
                     <a:schemeClr val="bg2"/>
@@ -8565,14 +7070,14 @@
           <a:effectLst/>
           <a:extLst>
             <a:ext uri="{909E8E84-426E-40DD-AFC4-6F175D3DCCD1}">
-              <a14:hiddenFill xmlns:a14="http://schemas.microsoft.com/office/drawing/2010/main">
+              <a14:hiddenFill xmlns="" xmlns:a14="http://schemas.microsoft.com/office/drawing/2010/main">
                 <a:solidFill>
                   <a:schemeClr val="accent1"/>
                 </a:solidFill>
               </a14:hiddenFill>
             </a:ext>
             <a:ext uri="{AF507438-7753-43E0-B8FC-AC1667EBCBE1}">
-              <a14:hiddenEffects xmlns:a14="http://schemas.microsoft.com/office/drawing/2010/main">
+              <a14:hiddenEffects xmlns="" xmlns:a14="http://schemas.microsoft.com/office/drawing/2010/main">
                 <a:effectLst>
                   <a:outerShdw dist="35921" dir="2700000" algn="ctr" rotWithShape="0">
                     <a:schemeClr val="bg2"/>
@@ -8644,14 +7149,14 @@
           <a:effectLst/>
           <a:extLst>
             <a:ext uri="{909E8E84-426E-40DD-AFC4-6F175D3DCCD1}">
-              <a14:hiddenFill xmlns:a14="http://schemas.microsoft.com/office/drawing/2010/main">
+              <a14:hiddenFill xmlns="" xmlns:a14="http://schemas.microsoft.com/office/drawing/2010/main">
                 <a:solidFill>
                   <a:schemeClr val="accent1"/>
                 </a:solidFill>
               </a14:hiddenFill>
             </a:ext>
             <a:ext uri="{AF507438-7753-43E0-B8FC-AC1667EBCBE1}">
-              <a14:hiddenEffects xmlns:a14="http://schemas.microsoft.com/office/drawing/2010/main">
+              <a14:hiddenEffects xmlns="" xmlns:a14="http://schemas.microsoft.com/office/drawing/2010/main">
                 <a:effectLst>
                   <a:outerShdw dist="35921" dir="2700000" algn="ctr" rotWithShape="0">
                     <a:schemeClr val="bg2"/>
@@ -8723,14 +7228,14 @@
           <a:effectLst/>
           <a:extLst>
             <a:ext uri="{909E8E84-426E-40DD-AFC4-6F175D3DCCD1}">
-              <a14:hiddenFill xmlns:a14="http://schemas.microsoft.com/office/drawing/2010/main">
+              <a14:hiddenFill xmlns="" xmlns:a14="http://schemas.microsoft.com/office/drawing/2010/main">
                 <a:solidFill>
                   <a:schemeClr val="accent1"/>
                 </a:solidFill>
               </a14:hiddenFill>
             </a:ext>
             <a:ext uri="{AF507438-7753-43E0-B8FC-AC1667EBCBE1}">
-              <a14:hiddenEffects xmlns:a14="http://schemas.microsoft.com/office/drawing/2010/main">
+              <a14:hiddenEffects xmlns="" xmlns:a14="http://schemas.microsoft.com/office/drawing/2010/main">
                 <a:effectLst>
                   <a:outerShdw dist="35921" dir="2700000" algn="ctr" rotWithShape="0">
                     <a:schemeClr val="bg2"/>
@@ -8819,14 +7324,14 @@
               <a:effectLst/>
               <a:extLst>
                 <a:ext uri="{909E8E84-426E-40DD-AFC4-6F175D3DCCD1}">
-                  <a14:hiddenFill xmlns:a14="http://schemas.microsoft.com/office/drawing/2010/main">
+                  <a14:hiddenFill xmlns="" xmlns:a14="http://schemas.microsoft.com/office/drawing/2010/main">
                     <a:solidFill>
                       <a:schemeClr val="accent1"/>
                     </a:solidFill>
                   </a14:hiddenFill>
                 </a:ext>
                 <a:ext uri="{AF507438-7753-43E0-B8FC-AC1667EBCBE1}">
-                  <a14:hiddenEffects xmlns:a14="http://schemas.microsoft.com/office/drawing/2010/main">
+                  <a14:hiddenEffects xmlns="" xmlns:a14="http://schemas.microsoft.com/office/drawing/2010/main">
                     <a:effectLst>
                       <a:outerShdw dist="35921" dir="2700000" algn="ctr" rotWithShape="0">
                         <a:schemeClr val="bg2"/>
@@ -8872,12 +7377,12 @@
               <a:effectLst/>
               <a:extLst>
                 <a:ext uri="{909E8E84-426E-40DD-AFC4-6F175D3DCCD1}">
-                  <a14:hiddenFill xmlns:a14="http://schemas.microsoft.com/office/drawing/2010/main">
+                  <a14:hiddenFill xmlns="" xmlns:a14="http://schemas.microsoft.com/office/drawing/2010/main">
                     <a:noFill/>
                   </a14:hiddenFill>
                 </a:ext>
                 <a:ext uri="{AF507438-7753-43E0-B8FC-AC1667EBCBE1}">
-                  <a14:hiddenEffects xmlns:a14="http://schemas.microsoft.com/office/drawing/2010/main">
+                  <a14:hiddenEffects xmlns="" xmlns:a14="http://schemas.microsoft.com/office/drawing/2010/main">
                     <a:effectLst>
                       <a:outerShdw dist="35921" dir="2700000" algn="ctr" rotWithShape="0">
                         <a:schemeClr val="bg2"/>
@@ -8919,14 +7424,14 @@
             <a:effectLst/>
             <a:extLst>
               <a:ext uri="{909E8E84-426E-40DD-AFC4-6F175D3DCCD1}">
-                <a14:hiddenFill xmlns:a14="http://schemas.microsoft.com/office/drawing/2010/main">
+                <a14:hiddenFill xmlns="" xmlns:a14="http://schemas.microsoft.com/office/drawing/2010/main">
                   <a:solidFill>
                     <a:schemeClr val="accent1"/>
                   </a:solidFill>
                 </a14:hiddenFill>
               </a:ext>
               <a:ext uri="{91240B29-F687-4F45-9708-019B960494DF}">
-                <a14:hiddenLine xmlns:a14="http://schemas.microsoft.com/office/drawing/2010/main" w="9525">
+                <a14:hiddenLine xmlns="" xmlns:a14="http://schemas.microsoft.com/office/drawing/2010/main" w="9525">
                   <a:solidFill>
                     <a:schemeClr val="tx1"/>
                   </a:solidFill>
@@ -8936,7 +7441,7 @@
                 </a14:hiddenLine>
               </a:ext>
               <a:ext uri="{AF507438-7753-43E0-B8FC-AC1667EBCBE1}">
-                <a14:hiddenEffects xmlns:a14="http://schemas.microsoft.com/office/drawing/2010/main">
+                <a14:hiddenEffects xmlns="" xmlns:a14="http://schemas.microsoft.com/office/drawing/2010/main">
                   <a:effectLst>
                     <a:outerShdw dist="35921" dir="2700000" algn="ctr" rotWithShape="0">
                       <a:schemeClr val="bg2"/>
@@ -8998,12 +7503,12 @@
           <a:effectLst/>
           <a:extLst>
             <a:ext uri="{909E8E84-426E-40DD-AFC4-6F175D3DCCD1}">
-              <a14:hiddenFill xmlns:a14="http://schemas.microsoft.com/office/drawing/2010/main">
+              <a14:hiddenFill xmlns="" xmlns:a14="http://schemas.microsoft.com/office/drawing/2010/main">
                 <a:noFill/>
               </a14:hiddenFill>
             </a:ext>
             <a:ext uri="{AF507438-7753-43E0-B8FC-AC1667EBCBE1}">
-              <a14:hiddenEffects xmlns:a14="http://schemas.microsoft.com/office/drawing/2010/main">
+              <a14:hiddenEffects xmlns="" xmlns:a14="http://schemas.microsoft.com/office/drawing/2010/main">
                 <a:effectLst>
                   <a:outerShdw dist="35921" dir="2700000" algn="ctr" rotWithShape="0">
                     <a:schemeClr val="bg2"/>
@@ -9044,12 +7549,12 @@
           <a:effectLst/>
           <a:extLst>
             <a:ext uri="{909E8E84-426E-40DD-AFC4-6F175D3DCCD1}">
-              <a14:hiddenFill xmlns:a14="http://schemas.microsoft.com/office/drawing/2010/main">
+              <a14:hiddenFill xmlns="" xmlns:a14="http://schemas.microsoft.com/office/drawing/2010/main">
                 <a:noFill/>
               </a14:hiddenFill>
             </a:ext>
             <a:ext uri="{AF507438-7753-43E0-B8FC-AC1667EBCBE1}">
-              <a14:hiddenEffects xmlns:a14="http://schemas.microsoft.com/office/drawing/2010/main">
+              <a14:hiddenEffects xmlns="" xmlns:a14="http://schemas.microsoft.com/office/drawing/2010/main">
                 <a:effectLst>
                   <a:outerShdw dist="35921" dir="2700000" algn="ctr" rotWithShape="0">
                     <a:schemeClr val="bg2"/>
@@ -9090,12 +7595,12 @@
           <a:effectLst/>
           <a:extLst>
             <a:ext uri="{909E8E84-426E-40DD-AFC4-6F175D3DCCD1}">
-              <a14:hiddenFill xmlns:a14="http://schemas.microsoft.com/office/drawing/2010/main">
+              <a14:hiddenFill xmlns="" xmlns:a14="http://schemas.microsoft.com/office/drawing/2010/main">
                 <a:noFill/>
               </a14:hiddenFill>
             </a:ext>
             <a:ext uri="{AF507438-7753-43E0-B8FC-AC1667EBCBE1}">
-              <a14:hiddenEffects xmlns:a14="http://schemas.microsoft.com/office/drawing/2010/main">
+              <a14:hiddenEffects xmlns="" xmlns:a14="http://schemas.microsoft.com/office/drawing/2010/main">
                 <a:effectLst>
                   <a:outerShdw dist="35921" dir="2700000" algn="ctr" rotWithShape="0">
                     <a:schemeClr val="bg2"/>
@@ -9136,12 +7641,12 @@
           <a:effectLst/>
           <a:extLst>
             <a:ext uri="{909E8E84-426E-40DD-AFC4-6F175D3DCCD1}">
-              <a14:hiddenFill xmlns:a14="http://schemas.microsoft.com/office/drawing/2010/main">
+              <a14:hiddenFill xmlns="" xmlns:a14="http://schemas.microsoft.com/office/drawing/2010/main">
                 <a:noFill/>
               </a14:hiddenFill>
             </a:ext>
             <a:ext uri="{AF507438-7753-43E0-B8FC-AC1667EBCBE1}">
-              <a14:hiddenEffects xmlns:a14="http://schemas.microsoft.com/office/drawing/2010/main">
+              <a14:hiddenEffects xmlns="" xmlns:a14="http://schemas.microsoft.com/office/drawing/2010/main">
                 <a:effectLst>
                   <a:outerShdw dist="35921" dir="2700000" algn="ctr" rotWithShape="0">
                     <a:schemeClr val="bg2"/>
@@ -9182,12 +7687,12 @@
           <a:effectLst/>
           <a:extLst>
             <a:ext uri="{909E8E84-426E-40DD-AFC4-6F175D3DCCD1}">
-              <a14:hiddenFill xmlns:a14="http://schemas.microsoft.com/office/drawing/2010/main">
+              <a14:hiddenFill xmlns="" xmlns:a14="http://schemas.microsoft.com/office/drawing/2010/main">
                 <a:noFill/>
               </a14:hiddenFill>
             </a:ext>
             <a:ext uri="{AF507438-7753-43E0-B8FC-AC1667EBCBE1}">
-              <a14:hiddenEffects xmlns:a14="http://schemas.microsoft.com/office/drawing/2010/main">
+              <a14:hiddenEffects xmlns="" xmlns:a14="http://schemas.microsoft.com/office/drawing/2010/main">
                 <a:effectLst>
                   <a:outerShdw dist="35921" dir="2700000" algn="ctr" rotWithShape="0">
                     <a:schemeClr val="bg2"/>
@@ -9221,14 +7726,14 @@
           <a:effectLst/>
           <a:extLst>
             <a:ext uri="{909E8E84-426E-40DD-AFC4-6F175D3DCCD1}">
-              <a14:hiddenFill xmlns:a14="http://schemas.microsoft.com/office/drawing/2010/main">
+              <a14:hiddenFill xmlns="" xmlns:a14="http://schemas.microsoft.com/office/drawing/2010/main">
                 <a:solidFill>
                   <a:schemeClr val="accent1"/>
                 </a:solidFill>
               </a14:hiddenFill>
             </a:ext>
             <a:ext uri="{91240B29-F687-4F45-9708-019B960494DF}">
-              <a14:hiddenLine xmlns:a14="http://schemas.microsoft.com/office/drawing/2010/main" w="9525">
+              <a14:hiddenLine xmlns="" xmlns:a14="http://schemas.microsoft.com/office/drawing/2010/main" w="9525">
                 <a:solidFill>
                   <a:schemeClr val="tx1"/>
                 </a:solidFill>
@@ -9238,7 +7743,7 @@
               </a14:hiddenLine>
             </a:ext>
             <a:ext uri="{AF507438-7753-43E0-B8FC-AC1667EBCBE1}">
-              <a14:hiddenEffects xmlns:a14="http://schemas.microsoft.com/office/drawing/2010/main">
+              <a14:hiddenEffects xmlns="" xmlns:a14="http://schemas.microsoft.com/office/drawing/2010/main">
                 <a:effectLst>
                   <a:outerShdw dist="35921" dir="2700000" algn="ctr" rotWithShape="0">
                     <a:schemeClr val="bg2"/>
@@ -9288,14 +7793,14 @@
           <a:effectLst/>
           <a:extLst>
             <a:ext uri="{909E8E84-426E-40DD-AFC4-6F175D3DCCD1}">
-              <a14:hiddenFill xmlns:a14="http://schemas.microsoft.com/office/drawing/2010/main">
+              <a14:hiddenFill xmlns="" xmlns:a14="http://schemas.microsoft.com/office/drawing/2010/main">
                 <a:solidFill>
                   <a:schemeClr val="accent1"/>
                 </a:solidFill>
               </a14:hiddenFill>
             </a:ext>
             <a:ext uri="{91240B29-F687-4F45-9708-019B960494DF}">
-              <a14:hiddenLine xmlns:a14="http://schemas.microsoft.com/office/drawing/2010/main" w="9525">
+              <a14:hiddenLine xmlns="" xmlns:a14="http://schemas.microsoft.com/office/drawing/2010/main" w="9525">
                 <a:solidFill>
                   <a:schemeClr val="tx1"/>
                 </a:solidFill>
@@ -9305,7 +7810,7 @@
               </a14:hiddenLine>
             </a:ext>
             <a:ext uri="{AF507438-7753-43E0-B8FC-AC1667EBCBE1}">
-              <a14:hiddenEffects xmlns:a14="http://schemas.microsoft.com/office/drawing/2010/main">
+              <a14:hiddenEffects xmlns="" xmlns:a14="http://schemas.microsoft.com/office/drawing/2010/main">
                 <a:effectLst>
                   <a:outerShdw dist="35921" dir="2700000" algn="ctr" rotWithShape="0">
                     <a:schemeClr val="bg2"/>
@@ -9355,14 +7860,14 @@
           <a:effectLst/>
           <a:extLst>
             <a:ext uri="{909E8E84-426E-40DD-AFC4-6F175D3DCCD1}">
-              <a14:hiddenFill xmlns:a14="http://schemas.microsoft.com/office/drawing/2010/main">
+              <a14:hiddenFill xmlns="" xmlns:a14="http://schemas.microsoft.com/office/drawing/2010/main">
                 <a:solidFill>
                   <a:schemeClr val="accent1"/>
                 </a:solidFill>
               </a14:hiddenFill>
             </a:ext>
             <a:ext uri="{91240B29-F687-4F45-9708-019B960494DF}">
-              <a14:hiddenLine xmlns:a14="http://schemas.microsoft.com/office/drawing/2010/main" w="9525">
+              <a14:hiddenLine xmlns="" xmlns:a14="http://schemas.microsoft.com/office/drawing/2010/main" w="9525">
                 <a:solidFill>
                   <a:schemeClr val="tx1"/>
                 </a:solidFill>
@@ -9372,7 +7877,7 @@
               </a14:hiddenLine>
             </a:ext>
             <a:ext uri="{AF507438-7753-43E0-B8FC-AC1667EBCBE1}">
-              <a14:hiddenEffects xmlns:a14="http://schemas.microsoft.com/office/drawing/2010/main">
+              <a14:hiddenEffects xmlns="" xmlns:a14="http://schemas.microsoft.com/office/drawing/2010/main">
                 <a:effectLst>
                   <a:outerShdw dist="35921" dir="2700000" algn="ctr" rotWithShape="0">
                     <a:schemeClr val="bg2"/>
@@ -9419,14 +7924,14 @@
           <a:effectLst/>
           <a:extLst>
             <a:ext uri="{909E8E84-426E-40DD-AFC4-6F175D3DCCD1}">
-              <a14:hiddenFill xmlns:a14="http://schemas.microsoft.com/office/drawing/2010/main">
+              <a14:hiddenFill xmlns="" xmlns:a14="http://schemas.microsoft.com/office/drawing/2010/main">
                 <a:solidFill>
                   <a:schemeClr val="accent1"/>
                 </a:solidFill>
               </a14:hiddenFill>
             </a:ext>
             <a:ext uri="{91240B29-F687-4F45-9708-019B960494DF}">
-              <a14:hiddenLine xmlns:a14="http://schemas.microsoft.com/office/drawing/2010/main" w="9525">
+              <a14:hiddenLine xmlns="" xmlns:a14="http://schemas.microsoft.com/office/drawing/2010/main" w="9525">
                 <a:solidFill>
                   <a:schemeClr val="tx1"/>
                 </a:solidFill>
@@ -9436,7 +7941,7 @@
               </a14:hiddenLine>
             </a:ext>
             <a:ext uri="{AF507438-7753-43E0-B8FC-AC1667EBCBE1}">
-              <a14:hiddenEffects xmlns:a14="http://schemas.microsoft.com/office/drawing/2010/main">
+              <a14:hiddenEffects xmlns="" xmlns:a14="http://schemas.microsoft.com/office/drawing/2010/main">
                 <a:effectLst>
                   <a:outerShdw dist="35921" dir="2700000" algn="ctr" rotWithShape="0">
                     <a:schemeClr val="bg2"/>
@@ -9490,14 +7995,14 @@
           <a:effectLst/>
           <a:extLst>
             <a:ext uri="{909E8E84-426E-40DD-AFC4-6F175D3DCCD1}">
-              <a14:hiddenFill xmlns:a14="http://schemas.microsoft.com/office/drawing/2010/main">
+              <a14:hiddenFill xmlns="" xmlns:a14="http://schemas.microsoft.com/office/drawing/2010/main">
                 <a:solidFill>
                   <a:schemeClr val="accent1"/>
                 </a:solidFill>
               </a14:hiddenFill>
             </a:ext>
             <a:ext uri="{91240B29-F687-4F45-9708-019B960494DF}">
-              <a14:hiddenLine xmlns:a14="http://schemas.microsoft.com/office/drawing/2010/main" w="9525">
+              <a14:hiddenLine xmlns="" xmlns:a14="http://schemas.microsoft.com/office/drawing/2010/main" w="9525">
                 <a:solidFill>
                   <a:schemeClr val="tx1"/>
                 </a:solidFill>
@@ -9507,7 +8012,7 @@
               </a14:hiddenLine>
             </a:ext>
             <a:ext uri="{AF507438-7753-43E0-B8FC-AC1667EBCBE1}">
-              <a14:hiddenEffects xmlns:a14="http://schemas.microsoft.com/office/drawing/2010/main">
+              <a14:hiddenEffects xmlns="" xmlns:a14="http://schemas.microsoft.com/office/drawing/2010/main">
                 <a:effectLst>
                   <a:outerShdw dist="35921" dir="2700000" algn="ctr" rotWithShape="0">
                     <a:schemeClr val="bg2"/>
@@ -9554,14 +8059,14 @@
           <a:effectLst/>
           <a:extLst>
             <a:ext uri="{909E8E84-426E-40DD-AFC4-6F175D3DCCD1}">
-              <a14:hiddenFill xmlns:a14="http://schemas.microsoft.com/office/drawing/2010/main">
+              <a14:hiddenFill xmlns="" xmlns:a14="http://schemas.microsoft.com/office/drawing/2010/main">
                 <a:solidFill>
                   <a:schemeClr val="accent1"/>
                 </a:solidFill>
               </a14:hiddenFill>
             </a:ext>
             <a:ext uri="{91240B29-F687-4F45-9708-019B960494DF}">
-              <a14:hiddenLine xmlns:a14="http://schemas.microsoft.com/office/drawing/2010/main" w="9525">
+              <a14:hiddenLine xmlns="" xmlns:a14="http://schemas.microsoft.com/office/drawing/2010/main" w="9525">
                 <a:solidFill>
                   <a:schemeClr val="tx1"/>
                 </a:solidFill>
@@ -9571,7 +8076,7 @@
               </a14:hiddenLine>
             </a:ext>
             <a:ext uri="{AF507438-7753-43E0-B8FC-AC1667EBCBE1}">
-              <a14:hiddenEffects xmlns:a14="http://schemas.microsoft.com/office/drawing/2010/main">
+              <a14:hiddenEffects xmlns="" xmlns:a14="http://schemas.microsoft.com/office/drawing/2010/main">
                 <a:effectLst>
                   <a:outerShdw dist="35921" dir="2700000" algn="ctr" rotWithShape="0">
                     <a:schemeClr val="bg2"/>
@@ -9626,14 +8131,14 @@
           <a:effectLst/>
           <a:extLst>
             <a:ext uri="{909E8E84-426E-40DD-AFC4-6F175D3DCCD1}">
-              <a14:hiddenFill xmlns:a14="http://schemas.microsoft.com/office/drawing/2010/main">
+              <a14:hiddenFill xmlns="" xmlns:a14="http://schemas.microsoft.com/office/drawing/2010/main">
                 <a:solidFill>
                   <a:schemeClr val="accent1"/>
                 </a:solidFill>
               </a14:hiddenFill>
             </a:ext>
             <a:ext uri="{AF507438-7753-43E0-B8FC-AC1667EBCBE1}">
-              <a14:hiddenEffects xmlns:a14="http://schemas.microsoft.com/office/drawing/2010/main">
+              <a14:hiddenEffects xmlns="" xmlns:a14="http://schemas.microsoft.com/office/drawing/2010/main">
                 <a:effectLst>
                   <a:outerShdw dist="35921" dir="2700000" algn="ctr" rotWithShape="0">
                     <a:schemeClr val="bg2"/>
@@ -9698,14 +8203,14 @@
           <a:effectLst/>
           <a:extLst>
             <a:ext uri="{909E8E84-426E-40DD-AFC4-6F175D3DCCD1}">
-              <a14:hiddenFill xmlns:a14="http://schemas.microsoft.com/office/drawing/2010/main">
+              <a14:hiddenFill xmlns="" xmlns:a14="http://schemas.microsoft.com/office/drawing/2010/main">
                 <a:solidFill>
                   <a:schemeClr val="accent1"/>
                 </a:solidFill>
               </a14:hiddenFill>
             </a:ext>
             <a:ext uri="{AF507438-7753-43E0-B8FC-AC1667EBCBE1}">
-              <a14:hiddenEffects xmlns:a14="http://schemas.microsoft.com/office/drawing/2010/main">
+              <a14:hiddenEffects xmlns="" xmlns:a14="http://schemas.microsoft.com/office/drawing/2010/main">
                 <a:effectLst>
                   <a:outerShdw dist="35921" dir="2700000" algn="ctr" rotWithShape="0">
                     <a:schemeClr val="bg2"/>
@@ -9770,14 +8275,14 @@
           <a:effectLst/>
           <a:extLst>
             <a:ext uri="{909E8E84-426E-40DD-AFC4-6F175D3DCCD1}">
-              <a14:hiddenFill xmlns:a14="http://schemas.microsoft.com/office/drawing/2010/main">
+              <a14:hiddenFill xmlns="" xmlns:a14="http://schemas.microsoft.com/office/drawing/2010/main">
                 <a:solidFill>
                   <a:schemeClr val="accent1"/>
                 </a:solidFill>
               </a14:hiddenFill>
             </a:ext>
             <a:ext uri="{AF507438-7753-43E0-B8FC-AC1667EBCBE1}">
-              <a14:hiddenEffects xmlns:a14="http://schemas.microsoft.com/office/drawing/2010/main">
+              <a14:hiddenEffects xmlns="" xmlns:a14="http://schemas.microsoft.com/office/drawing/2010/main">
                 <a:effectLst>
                   <a:outerShdw dist="35921" dir="2700000" algn="ctr" rotWithShape="0">
                     <a:schemeClr val="bg2"/>
@@ -9894,14 +8399,14 @@
               <a:effectLst/>
               <a:extLst>
                 <a:ext uri="{909E8E84-426E-40DD-AFC4-6F175D3DCCD1}">
-                  <a14:hiddenFill xmlns:a14="http://schemas.microsoft.com/office/drawing/2010/main">
+                  <a14:hiddenFill xmlns="" xmlns:a14="http://schemas.microsoft.com/office/drawing/2010/main">
                     <a:solidFill>
                       <a:schemeClr val="accent1"/>
                     </a:solidFill>
                   </a14:hiddenFill>
                 </a:ext>
                 <a:ext uri="{AF507438-7753-43E0-B8FC-AC1667EBCBE1}">
-                  <a14:hiddenEffects xmlns:a14="http://schemas.microsoft.com/office/drawing/2010/main">
+                  <a14:hiddenEffects xmlns="" xmlns:a14="http://schemas.microsoft.com/office/drawing/2010/main">
                     <a:effectLst>
                       <a:outerShdw dist="35921" dir="2700000" algn="ctr" rotWithShape="0">
                         <a:schemeClr val="bg2"/>
@@ -9947,12 +8452,12 @@
               <a:effectLst/>
               <a:extLst>
                 <a:ext uri="{909E8E84-426E-40DD-AFC4-6F175D3DCCD1}">
-                  <a14:hiddenFill xmlns:a14="http://schemas.microsoft.com/office/drawing/2010/main">
+                  <a14:hiddenFill xmlns="" xmlns:a14="http://schemas.microsoft.com/office/drawing/2010/main">
                     <a:noFill/>
                   </a14:hiddenFill>
                 </a:ext>
                 <a:ext uri="{AF507438-7753-43E0-B8FC-AC1667EBCBE1}">
-                  <a14:hiddenEffects xmlns:a14="http://schemas.microsoft.com/office/drawing/2010/main">
+                  <a14:hiddenEffects xmlns="" xmlns:a14="http://schemas.microsoft.com/office/drawing/2010/main">
                     <a:effectLst>
                       <a:outerShdw dist="35921" dir="2700000" algn="ctr" rotWithShape="0">
                         <a:schemeClr val="bg2"/>
@@ -9994,14 +8499,14 @@
             <a:effectLst/>
             <a:extLst>
               <a:ext uri="{909E8E84-426E-40DD-AFC4-6F175D3DCCD1}">
-                <a14:hiddenFill xmlns:a14="http://schemas.microsoft.com/office/drawing/2010/main">
+                <a14:hiddenFill xmlns="" xmlns:a14="http://schemas.microsoft.com/office/drawing/2010/main">
                   <a:solidFill>
                     <a:schemeClr val="accent1"/>
                   </a:solidFill>
                 </a14:hiddenFill>
               </a:ext>
               <a:ext uri="{91240B29-F687-4F45-9708-019B960494DF}">
-                <a14:hiddenLine xmlns:a14="http://schemas.microsoft.com/office/drawing/2010/main" w="9525">
+                <a14:hiddenLine xmlns="" xmlns:a14="http://schemas.microsoft.com/office/drawing/2010/main" w="9525">
                   <a:solidFill>
                     <a:schemeClr val="tx1"/>
                   </a:solidFill>
@@ -10011,7 +8516,7 @@
                 </a14:hiddenLine>
               </a:ext>
               <a:ext uri="{AF507438-7753-43E0-B8FC-AC1667EBCBE1}">
-                <a14:hiddenEffects xmlns:a14="http://schemas.microsoft.com/office/drawing/2010/main">
+                <a14:hiddenEffects xmlns="" xmlns:a14="http://schemas.microsoft.com/office/drawing/2010/main">
                   <a:effectLst>
                     <a:outerShdw dist="35921" dir="2700000" algn="ctr" rotWithShape="0">
                       <a:schemeClr val="bg2"/>
@@ -10071,12 +8576,12 @@
           <a:effectLst/>
           <a:extLst>
             <a:ext uri="{909E8E84-426E-40DD-AFC4-6F175D3DCCD1}">
-              <a14:hiddenFill xmlns:a14="http://schemas.microsoft.com/office/drawing/2010/main">
+              <a14:hiddenFill xmlns="" xmlns:a14="http://schemas.microsoft.com/office/drawing/2010/main">
                 <a:noFill/>
               </a14:hiddenFill>
             </a:ext>
             <a:ext uri="{AF507438-7753-43E0-B8FC-AC1667EBCBE1}">
-              <a14:hiddenEffects xmlns:a14="http://schemas.microsoft.com/office/drawing/2010/main">
+              <a14:hiddenEffects xmlns="" xmlns:a14="http://schemas.microsoft.com/office/drawing/2010/main">
                 <a:effectLst>
                   <a:outerShdw dist="35921" dir="2700000" algn="ctr" rotWithShape="0">
                     <a:schemeClr val="bg2"/>
@@ -10119,12 +8624,12 @@
           <a:effectLst/>
           <a:extLst>
             <a:ext uri="{909E8E84-426E-40DD-AFC4-6F175D3DCCD1}">
-              <a14:hiddenFill xmlns:a14="http://schemas.microsoft.com/office/drawing/2010/main">
+              <a14:hiddenFill xmlns="" xmlns:a14="http://schemas.microsoft.com/office/drawing/2010/main">
                 <a:noFill/>
               </a14:hiddenFill>
             </a:ext>
             <a:ext uri="{AF507438-7753-43E0-B8FC-AC1667EBCBE1}">
-              <a14:hiddenEffects xmlns:a14="http://schemas.microsoft.com/office/drawing/2010/main">
+              <a14:hiddenEffects xmlns="" xmlns:a14="http://schemas.microsoft.com/office/drawing/2010/main">
                 <a:effectLst>
                   <a:outerShdw dist="35921" dir="2700000" algn="ctr" rotWithShape="0">
                     <a:schemeClr val="bg2"/>
@@ -10195,14 +8700,14 @@
               <a:effectLst/>
               <a:extLst>
                 <a:ext uri="{909E8E84-426E-40DD-AFC4-6F175D3DCCD1}">
-                  <a14:hiddenFill xmlns:a14="http://schemas.microsoft.com/office/drawing/2010/main">
+                  <a14:hiddenFill xmlns="" xmlns:a14="http://schemas.microsoft.com/office/drawing/2010/main">
                     <a:solidFill>
                       <a:schemeClr val="accent1"/>
                     </a:solidFill>
                   </a14:hiddenFill>
                 </a:ext>
                 <a:ext uri="{AF507438-7753-43E0-B8FC-AC1667EBCBE1}">
-                  <a14:hiddenEffects xmlns:a14="http://schemas.microsoft.com/office/drawing/2010/main">
+                  <a14:hiddenEffects xmlns="" xmlns:a14="http://schemas.microsoft.com/office/drawing/2010/main">
                     <a:effectLst>
                       <a:outerShdw dist="35921" dir="2700000" algn="ctr" rotWithShape="0">
                         <a:schemeClr val="bg2"/>
@@ -10248,12 +8753,12 @@
               <a:effectLst/>
               <a:extLst>
                 <a:ext uri="{909E8E84-426E-40DD-AFC4-6F175D3DCCD1}">
-                  <a14:hiddenFill xmlns:a14="http://schemas.microsoft.com/office/drawing/2010/main">
+                  <a14:hiddenFill xmlns="" xmlns:a14="http://schemas.microsoft.com/office/drawing/2010/main">
                     <a:noFill/>
                   </a14:hiddenFill>
                 </a:ext>
                 <a:ext uri="{AF507438-7753-43E0-B8FC-AC1667EBCBE1}">
-                  <a14:hiddenEffects xmlns:a14="http://schemas.microsoft.com/office/drawing/2010/main">
+                  <a14:hiddenEffects xmlns="" xmlns:a14="http://schemas.microsoft.com/office/drawing/2010/main">
                     <a:effectLst>
                       <a:outerShdw dist="35921" dir="2700000" algn="ctr" rotWithShape="0">
                         <a:schemeClr val="bg2"/>
@@ -10295,14 +8800,14 @@
             <a:effectLst/>
             <a:extLst>
               <a:ext uri="{909E8E84-426E-40DD-AFC4-6F175D3DCCD1}">
-                <a14:hiddenFill xmlns:a14="http://schemas.microsoft.com/office/drawing/2010/main">
+                <a14:hiddenFill xmlns="" xmlns:a14="http://schemas.microsoft.com/office/drawing/2010/main">
                   <a:solidFill>
                     <a:schemeClr val="accent1"/>
                   </a:solidFill>
                 </a14:hiddenFill>
               </a:ext>
               <a:ext uri="{91240B29-F687-4F45-9708-019B960494DF}">
-                <a14:hiddenLine xmlns:a14="http://schemas.microsoft.com/office/drawing/2010/main" w="9525">
+                <a14:hiddenLine xmlns="" xmlns:a14="http://schemas.microsoft.com/office/drawing/2010/main" w="9525">
                   <a:solidFill>
                     <a:schemeClr val="tx1"/>
                   </a:solidFill>
@@ -10312,7 +8817,7 @@
                 </a14:hiddenLine>
               </a:ext>
               <a:ext uri="{AF507438-7753-43E0-B8FC-AC1667EBCBE1}">
-                <a14:hiddenEffects xmlns:a14="http://schemas.microsoft.com/office/drawing/2010/main">
+                <a14:hiddenEffects xmlns="" xmlns:a14="http://schemas.microsoft.com/office/drawing/2010/main">
                   <a:effectLst>
                     <a:outerShdw dist="35921" dir="2700000" algn="ctr" rotWithShape="0">
                       <a:schemeClr val="bg2"/>
@@ -10372,12 +8877,12 @@
           <a:effectLst/>
           <a:extLst>
             <a:ext uri="{909E8E84-426E-40DD-AFC4-6F175D3DCCD1}">
-              <a14:hiddenFill xmlns:a14="http://schemas.microsoft.com/office/drawing/2010/main">
+              <a14:hiddenFill xmlns="" xmlns:a14="http://schemas.microsoft.com/office/drawing/2010/main">
                 <a:noFill/>
               </a14:hiddenFill>
             </a:ext>
             <a:ext uri="{AF507438-7753-43E0-B8FC-AC1667EBCBE1}">
-              <a14:hiddenEffects xmlns:a14="http://schemas.microsoft.com/office/drawing/2010/main">
+              <a14:hiddenEffects xmlns="" xmlns:a14="http://schemas.microsoft.com/office/drawing/2010/main">
                 <a:effectLst>
                   <a:outerShdw dist="35921" dir="2700000" algn="ctr" rotWithShape="0">
                     <a:schemeClr val="bg2"/>
@@ -10421,12 +8926,12 @@
           <a:effectLst/>
           <a:extLst>
             <a:ext uri="{909E8E84-426E-40DD-AFC4-6F175D3DCCD1}">
-              <a14:hiddenFill xmlns:a14="http://schemas.microsoft.com/office/drawing/2010/main">
+              <a14:hiddenFill xmlns="" xmlns:a14="http://schemas.microsoft.com/office/drawing/2010/main">
                 <a:noFill/>
               </a14:hiddenFill>
             </a:ext>
             <a:ext uri="{AF507438-7753-43E0-B8FC-AC1667EBCBE1}">
-              <a14:hiddenEffects xmlns:a14="http://schemas.microsoft.com/office/drawing/2010/main">
+              <a14:hiddenEffects xmlns="" xmlns:a14="http://schemas.microsoft.com/office/drawing/2010/main">
                 <a:effectLst>
                   <a:outerShdw dist="35921" dir="2700000" algn="ctr" rotWithShape="0">
                     <a:schemeClr val="bg2"/>
@@ -10470,12 +8975,12 @@
           <a:effectLst/>
           <a:extLst>
             <a:ext uri="{909E8E84-426E-40DD-AFC4-6F175D3DCCD1}">
-              <a14:hiddenFill xmlns:a14="http://schemas.microsoft.com/office/drawing/2010/main">
+              <a14:hiddenFill xmlns="" xmlns:a14="http://schemas.microsoft.com/office/drawing/2010/main">
                 <a:noFill/>
               </a14:hiddenFill>
             </a:ext>
             <a:ext uri="{AF507438-7753-43E0-B8FC-AC1667EBCBE1}">
-              <a14:hiddenEffects xmlns:a14="http://schemas.microsoft.com/office/drawing/2010/main">
+              <a14:hiddenEffects xmlns="" xmlns:a14="http://schemas.microsoft.com/office/drawing/2010/main">
                 <a:effectLst>
                   <a:outerShdw dist="35921" dir="2700000" algn="ctr" rotWithShape="0">
                     <a:schemeClr val="bg2"/>
@@ -10516,12 +9021,12 @@
           <a:effectLst/>
           <a:extLst>
             <a:ext uri="{909E8E84-426E-40DD-AFC4-6F175D3DCCD1}">
-              <a14:hiddenFill xmlns:a14="http://schemas.microsoft.com/office/drawing/2010/main">
+              <a14:hiddenFill xmlns="" xmlns:a14="http://schemas.microsoft.com/office/drawing/2010/main">
                 <a:noFill/>
               </a14:hiddenFill>
             </a:ext>
             <a:ext uri="{AF507438-7753-43E0-B8FC-AC1667EBCBE1}">
-              <a14:hiddenEffects xmlns:a14="http://schemas.microsoft.com/office/drawing/2010/main">
+              <a14:hiddenEffects xmlns="" xmlns:a14="http://schemas.microsoft.com/office/drawing/2010/main">
                 <a:effectLst>
                   <a:outerShdw dist="35921" dir="2700000" algn="ctr" rotWithShape="0">
                     <a:schemeClr val="bg2"/>
@@ -10555,14 +9060,14 @@
           <a:effectLst/>
           <a:extLst>
             <a:ext uri="{909E8E84-426E-40DD-AFC4-6F175D3DCCD1}">
-              <a14:hiddenFill xmlns:a14="http://schemas.microsoft.com/office/drawing/2010/main">
+              <a14:hiddenFill xmlns="" xmlns:a14="http://schemas.microsoft.com/office/drawing/2010/main">
                 <a:solidFill>
                   <a:schemeClr val="accent1"/>
                 </a:solidFill>
               </a14:hiddenFill>
             </a:ext>
             <a:ext uri="{91240B29-F687-4F45-9708-019B960494DF}">
-              <a14:hiddenLine xmlns:a14="http://schemas.microsoft.com/office/drawing/2010/main" w="9525">
+              <a14:hiddenLine xmlns="" xmlns:a14="http://schemas.microsoft.com/office/drawing/2010/main" w="9525">
                 <a:solidFill>
                   <a:schemeClr val="tx1"/>
                 </a:solidFill>
@@ -10572,7 +9077,7 @@
               </a14:hiddenLine>
             </a:ext>
             <a:ext uri="{AF507438-7753-43E0-B8FC-AC1667EBCBE1}">
-              <a14:hiddenEffects xmlns:a14="http://schemas.microsoft.com/office/drawing/2010/main">
+              <a14:hiddenEffects xmlns="" xmlns:a14="http://schemas.microsoft.com/office/drawing/2010/main">
                 <a:effectLst>
                   <a:outerShdw dist="35921" dir="2700000" algn="ctr" rotWithShape="0">
                     <a:schemeClr val="bg2"/>
@@ -10618,14 +9123,14 @@
           <a:effectLst/>
           <a:extLst>
             <a:ext uri="{909E8E84-426E-40DD-AFC4-6F175D3DCCD1}">
-              <a14:hiddenFill xmlns:a14="http://schemas.microsoft.com/office/drawing/2010/main">
+              <a14:hiddenFill xmlns="" xmlns:a14="http://schemas.microsoft.com/office/drawing/2010/main">
                 <a:solidFill>
                   <a:schemeClr val="accent1"/>
                 </a:solidFill>
               </a14:hiddenFill>
             </a:ext>
             <a:ext uri="{91240B29-F687-4F45-9708-019B960494DF}">
-              <a14:hiddenLine xmlns:a14="http://schemas.microsoft.com/office/drawing/2010/main" w="9525">
+              <a14:hiddenLine xmlns="" xmlns:a14="http://schemas.microsoft.com/office/drawing/2010/main" w="9525">
                 <a:solidFill>
                   <a:schemeClr val="tx1"/>
                 </a:solidFill>
@@ -10635,7 +9140,7 @@
               </a14:hiddenLine>
             </a:ext>
             <a:ext uri="{AF507438-7753-43E0-B8FC-AC1667EBCBE1}">
-              <a14:hiddenEffects xmlns:a14="http://schemas.microsoft.com/office/drawing/2010/main">
+              <a14:hiddenEffects xmlns="" xmlns:a14="http://schemas.microsoft.com/office/drawing/2010/main">
                 <a:effectLst>
                   <a:outerShdw dist="35921" dir="2700000" algn="ctr" rotWithShape="0">
                     <a:schemeClr val="bg2"/>
@@ -10681,14 +9186,14 @@
           <a:effectLst/>
           <a:extLst>
             <a:ext uri="{909E8E84-426E-40DD-AFC4-6F175D3DCCD1}">
-              <a14:hiddenFill xmlns:a14="http://schemas.microsoft.com/office/drawing/2010/main">
+              <a14:hiddenFill xmlns="" xmlns:a14="http://schemas.microsoft.com/office/drawing/2010/main">
                 <a:solidFill>
                   <a:schemeClr val="accent1"/>
                 </a:solidFill>
               </a14:hiddenFill>
             </a:ext>
             <a:ext uri="{91240B29-F687-4F45-9708-019B960494DF}">
-              <a14:hiddenLine xmlns:a14="http://schemas.microsoft.com/office/drawing/2010/main" w="9525">
+              <a14:hiddenLine xmlns="" xmlns:a14="http://schemas.microsoft.com/office/drawing/2010/main" w="9525">
                 <a:solidFill>
                   <a:schemeClr val="tx1"/>
                 </a:solidFill>
@@ -10698,7 +9203,7 @@
               </a14:hiddenLine>
             </a:ext>
             <a:ext uri="{AF507438-7753-43E0-B8FC-AC1667EBCBE1}">
-              <a14:hiddenEffects xmlns:a14="http://schemas.microsoft.com/office/drawing/2010/main">
+              <a14:hiddenEffects xmlns="" xmlns:a14="http://schemas.microsoft.com/office/drawing/2010/main">
                 <a:effectLst>
                   <a:outerShdw dist="35921" dir="2700000" algn="ctr" rotWithShape="0">
                     <a:schemeClr val="bg2"/>
@@ -10744,14 +9249,14 @@
           <a:effectLst/>
           <a:extLst>
             <a:ext uri="{909E8E84-426E-40DD-AFC4-6F175D3DCCD1}">
-              <a14:hiddenFill xmlns:a14="http://schemas.microsoft.com/office/drawing/2010/main">
+              <a14:hiddenFill xmlns="" xmlns:a14="http://schemas.microsoft.com/office/drawing/2010/main">
                 <a:solidFill>
                   <a:schemeClr val="accent1"/>
                 </a:solidFill>
               </a14:hiddenFill>
             </a:ext>
             <a:ext uri="{91240B29-F687-4F45-9708-019B960494DF}">
-              <a14:hiddenLine xmlns:a14="http://schemas.microsoft.com/office/drawing/2010/main" w="9525">
+              <a14:hiddenLine xmlns="" xmlns:a14="http://schemas.microsoft.com/office/drawing/2010/main" w="9525">
                 <a:solidFill>
                   <a:schemeClr val="tx1"/>
                 </a:solidFill>
@@ -10761,7 +9266,7 @@
               </a14:hiddenLine>
             </a:ext>
             <a:ext uri="{AF507438-7753-43E0-B8FC-AC1667EBCBE1}">
-              <a14:hiddenEffects xmlns:a14="http://schemas.microsoft.com/office/drawing/2010/main">
+              <a14:hiddenEffects xmlns="" xmlns:a14="http://schemas.microsoft.com/office/drawing/2010/main">
                 <a:effectLst>
                   <a:outerShdw dist="35921" dir="2700000" algn="ctr" rotWithShape="0">
                     <a:schemeClr val="bg2"/>
@@ -10807,14 +9312,14 @@
           <a:effectLst/>
           <a:extLst>
             <a:ext uri="{909E8E84-426E-40DD-AFC4-6F175D3DCCD1}">
-              <a14:hiddenFill xmlns:a14="http://schemas.microsoft.com/office/drawing/2010/main">
+              <a14:hiddenFill xmlns="" xmlns:a14="http://schemas.microsoft.com/office/drawing/2010/main">
                 <a:solidFill>
                   <a:schemeClr val="accent1"/>
                 </a:solidFill>
               </a14:hiddenFill>
             </a:ext>
             <a:ext uri="{91240B29-F687-4F45-9708-019B960494DF}">
-              <a14:hiddenLine xmlns:a14="http://schemas.microsoft.com/office/drawing/2010/main" w="9525">
+              <a14:hiddenLine xmlns="" xmlns:a14="http://schemas.microsoft.com/office/drawing/2010/main" w="9525">
                 <a:solidFill>
                   <a:schemeClr val="tx1"/>
                 </a:solidFill>
@@ -10824,7 +9329,7 @@
               </a14:hiddenLine>
             </a:ext>
             <a:ext uri="{AF507438-7753-43E0-B8FC-AC1667EBCBE1}">
-              <a14:hiddenEffects xmlns:a14="http://schemas.microsoft.com/office/drawing/2010/main">
+              <a14:hiddenEffects xmlns="" xmlns:a14="http://schemas.microsoft.com/office/drawing/2010/main">
                 <a:effectLst>
                   <a:outerShdw dist="35921" dir="2700000" algn="ctr" rotWithShape="0">
                     <a:schemeClr val="bg2"/>
@@ -10870,14 +9375,14 @@
           <a:effectLst/>
           <a:extLst>
             <a:ext uri="{909E8E84-426E-40DD-AFC4-6F175D3DCCD1}">
-              <a14:hiddenFill xmlns:a14="http://schemas.microsoft.com/office/drawing/2010/main">
+              <a14:hiddenFill xmlns="" xmlns:a14="http://schemas.microsoft.com/office/drawing/2010/main">
                 <a:solidFill>
                   <a:schemeClr val="accent1"/>
                 </a:solidFill>
               </a14:hiddenFill>
             </a:ext>
             <a:ext uri="{91240B29-F687-4F45-9708-019B960494DF}">
-              <a14:hiddenLine xmlns:a14="http://schemas.microsoft.com/office/drawing/2010/main" w="9525">
+              <a14:hiddenLine xmlns="" xmlns:a14="http://schemas.microsoft.com/office/drawing/2010/main" w="9525">
                 <a:solidFill>
                   <a:schemeClr val="tx1"/>
                 </a:solidFill>
@@ -10887,7 +9392,7 @@
               </a14:hiddenLine>
             </a:ext>
             <a:ext uri="{AF507438-7753-43E0-B8FC-AC1667EBCBE1}">
-              <a14:hiddenEffects xmlns:a14="http://schemas.microsoft.com/office/drawing/2010/main">
+              <a14:hiddenEffects xmlns="" xmlns:a14="http://schemas.microsoft.com/office/drawing/2010/main">
                 <a:effectLst>
                   <a:outerShdw dist="35921" dir="2700000" algn="ctr" rotWithShape="0">
                     <a:schemeClr val="bg2"/>
@@ -10943,12 +9448,12 @@
           <a:effectLst/>
           <a:extLst>
             <a:ext uri="{909E8E84-426E-40DD-AFC4-6F175D3DCCD1}">
-              <a14:hiddenFill xmlns:a14="http://schemas.microsoft.com/office/drawing/2010/main">
+              <a14:hiddenFill xmlns="" xmlns:a14="http://schemas.microsoft.com/office/drawing/2010/main">
                 <a:noFill/>
               </a14:hiddenFill>
             </a:ext>
             <a:ext uri="{AF507438-7753-43E0-B8FC-AC1667EBCBE1}">
-              <a14:hiddenEffects xmlns:a14="http://schemas.microsoft.com/office/drawing/2010/main">
+              <a14:hiddenEffects xmlns="" xmlns:a14="http://schemas.microsoft.com/office/drawing/2010/main">
                 <a:effectLst>
                   <a:outerShdw dist="35921" dir="2700000" algn="ctr" rotWithShape="0">
                     <a:schemeClr val="bg2"/>
@@ -10982,14 +9487,14 @@
           <a:effectLst/>
           <a:extLst>
             <a:ext uri="{909E8E84-426E-40DD-AFC4-6F175D3DCCD1}">
-              <a14:hiddenFill xmlns:a14="http://schemas.microsoft.com/office/drawing/2010/main">
+              <a14:hiddenFill xmlns="" xmlns:a14="http://schemas.microsoft.com/office/drawing/2010/main">
                 <a:solidFill>
                   <a:schemeClr val="accent1"/>
                 </a:solidFill>
               </a14:hiddenFill>
             </a:ext>
             <a:ext uri="{91240B29-F687-4F45-9708-019B960494DF}">
-              <a14:hiddenLine xmlns:a14="http://schemas.microsoft.com/office/drawing/2010/main" w="9525">
+              <a14:hiddenLine xmlns="" xmlns:a14="http://schemas.microsoft.com/office/drawing/2010/main" w="9525">
                 <a:solidFill>
                   <a:schemeClr val="tx1"/>
                 </a:solidFill>
@@ -10999,7 +9504,7 @@
               </a14:hiddenLine>
             </a:ext>
             <a:ext uri="{AF507438-7753-43E0-B8FC-AC1667EBCBE1}">
-              <a14:hiddenEffects xmlns:a14="http://schemas.microsoft.com/office/drawing/2010/main">
+              <a14:hiddenEffects xmlns="" xmlns:a14="http://schemas.microsoft.com/office/drawing/2010/main">
                 <a:effectLst>
                   <a:outerShdw dist="35921" dir="2700000" algn="ctr" rotWithShape="0">
                     <a:schemeClr val="bg2"/>
@@ -11069,7 +9574,7 @@
     </p:spTree>
     <p:extLst>
       <p:ext uri="{BB962C8B-B14F-4D97-AF65-F5344CB8AC3E}">
-        <p14:creationId xmlns:p14="http://schemas.microsoft.com/office/powerpoint/2010/main" val="937104392"/>
+        <p14:creationId xmlns="" xmlns:p14="http://schemas.microsoft.com/office/powerpoint/2010/main" val="937104392"/>
       </p:ext>
     </p:extLst>
   </p:cSld>
@@ -11131,14 +9636,14 @@
           <a:effectLst/>
           <a:extLst>
             <a:ext uri="{909E8E84-426E-40DD-AFC4-6F175D3DCCD1}">
-              <a14:hiddenFill xmlns:a14="http://schemas.microsoft.com/office/drawing/2010/main">
+              <a14:hiddenFill xmlns="" xmlns:a14="http://schemas.microsoft.com/office/drawing/2010/main">
                 <a:solidFill>
                   <a:schemeClr val="accent1"/>
                 </a:solidFill>
               </a14:hiddenFill>
             </a:ext>
             <a:ext uri="{AF507438-7753-43E0-B8FC-AC1667EBCBE1}">
-              <a14:hiddenEffects xmlns:a14="http://schemas.microsoft.com/office/drawing/2010/main">
+              <a14:hiddenEffects xmlns="" xmlns:a14="http://schemas.microsoft.com/office/drawing/2010/main">
                 <a:effectLst>
                   <a:outerShdw dist="35921" dir="2700000" algn="ctr" rotWithShape="0">
                     <a:schemeClr val="bg2"/>
@@ -11203,14 +9708,14 @@
           <a:effectLst/>
           <a:extLst>
             <a:ext uri="{909E8E84-426E-40DD-AFC4-6F175D3DCCD1}">
-              <a14:hiddenFill xmlns:a14="http://schemas.microsoft.com/office/drawing/2010/main">
+              <a14:hiddenFill xmlns="" xmlns:a14="http://schemas.microsoft.com/office/drawing/2010/main">
                 <a:solidFill>
                   <a:schemeClr val="accent1"/>
                 </a:solidFill>
               </a14:hiddenFill>
             </a:ext>
             <a:ext uri="{AF507438-7753-43E0-B8FC-AC1667EBCBE1}">
-              <a14:hiddenEffects xmlns:a14="http://schemas.microsoft.com/office/drawing/2010/main">
+              <a14:hiddenEffects xmlns="" xmlns:a14="http://schemas.microsoft.com/office/drawing/2010/main">
                 <a:effectLst>
                   <a:outerShdw dist="35921" dir="2700000" algn="ctr" rotWithShape="0">
                     <a:schemeClr val="bg2"/>
@@ -11266,12 +9771,12 @@
           <a:effectLst/>
           <a:extLst>
             <a:ext uri="{909E8E84-426E-40DD-AFC4-6F175D3DCCD1}">
-              <a14:hiddenFill xmlns:a14="http://schemas.microsoft.com/office/drawing/2010/main">
+              <a14:hiddenFill xmlns="" xmlns:a14="http://schemas.microsoft.com/office/drawing/2010/main">
                 <a:noFill/>
               </a14:hiddenFill>
             </a:ext>
             <a:ext uri="{AF507438-7753-43E0-B8FC-AC1667EBCBE1}">
-              <a14:hiddenEffects xmlns:a14="http://schemas.microsoft.com/office/drawing/2010/main">
+              <a14:hiddenEffects xmlns="" xmlns:a14="http://schemas.microsoft.com/office/drawing/2010/main">
                 <a:effectLst>
                   <a:outerShdw dist="35921" dir="2700000" algn="ctr" rotWithShape="0">
                     <a:schemeClr val="bg2"/>
@@ -11314,12 +9819,12 @@
           <a:effectLst/>
           <a:extLst>
             <a:ext uri="{909E8E84-426E-40DD-AFC4-6F175D3DCCD1}">
-              <a14:hiddenFill xmlns:a14="http://schemas.microsoft.com/office/drawing/2010/main">
+              <a14:hiddenFill xmlns="" xmlns:a14="http://schemas.microsoft.com/office/drawing/2010/main">
                 <a:noFill/>
               </a14:hiddenFill>
             </a:ext>
             <a:ext uri="{AF507438-7753-43E0-B8FC-AC1667EBCBE1}">
-              <a14:hiddenEffects xmlns:a14="http://schemas.microsoft.com/office/drawing/2010/main">
+              <a14:hiddenEffects xmlns="" xmlns:a14="http://schemas.microsoft.com/office/drawing/2010/main">
                 <a:effectLst>
                   <a:outerShdw dist="35921" dir="2700000" algn="ctr" rotWithShape="0">
                     <a:schemeClr val="bg2"/>
@@ -11353,14 +9858,14 @@
           <a:effectLst/>
           <a:extLst>
             <a:ext uri="{909E8E84-426E-40DD-AFC4-6F175D3DCCD1}">
-              <a14:hiddenFill xmlns:a14="http://schemas.microsoft.com/office/drawing/2010/main">
+              <a14:hiddenFill xmlns="" xmlns:a14="http://schemas.microsoft.com/office/drawing/2010/main">
                 <a:solidFill>
                   <a:schemeClr val="accent1"/>
                 </a:solidFill>
               </a14:hiddenFill>
             </a:ext>
             <a:ext uri="{91240B29-F687-4F45-9708-019B960494DF}">
-              <a14:hiddenLine xmlns:a14="http://schemas.microsoft.com/office/drawing/2010/main" w="9525">
+              <a14:hiddenLine xmlns="" xmlns:a14="http://schemas.microsoft.com/office/drawing/2010/main" w="9525">
                 <a:solidFill>
                   <a:schemeClr val="tx1"/>
                 </a:solidFill>
@@ -11370,7 +9875,7 @@
               </a14:hiddenLine>
             </a:ext>
             <a:ext uri="{AF507438-7753-43E0-B8FC-AC1667EBCBE1}">
-              <a14:hiddenEffects xmlns:a14="http://schemas.microsoft.com/office/drawing/2010/main">
+              <a14:hiddenEffects xmlns="" xmlns:a14="http://schemas.microsoft.com/office/drawing/2010/main">
                 <a:effectLst>
                   <a:outerShdw dist="35921" dir="2700000" algn="ctr" rotWithShape="0">
                     <a:schemeClr val="bg2"/>
@@ -11416,14 +9921,14 @@
           <a:effectLst/>
           <a:extLst>
             <a:ext uri="{909E8E84-426E-40DD-AFC4-6F175D3DCCD1}">
-              <a14:hiddenFill xmlns:a14="http://schemas.microsoft.com/office/drawing/2010/main">
+              <a14:hiddenFill xmlns="" xmlns:a14="http://schemas.microsoft.com/office/drawing/2010/main">
                 <a:solidFill>
                   <a:schemeClr val="accent1"/>
                 </a:solidFill>
               </a14:hiddenFill>
             </a:ext>
             <a:ext uri="{91240B29-F687-4F45-9708-019B960494DF}">
-              <a14:hiddenLine xmlns:a14="http://schemas.microsoft.com/office/drawing/2010/main" w="9525">
+              <a14:hiddenLine xmlns="" xmlns:a14="http://schemas.microsoft.com/office/drawing/2010/main" w="9525">
                 <a:solidFill>
                   <a:schemeClr val="tx1"/>
                 </a:solidFill>
@@ -11433,7 +9938,7 @@
               </a14:hiddenLine>
             </a:ext>
             <a:ext uri="{AF507438-7753-43E0-B8FC-AC1667EBCBE1}">
-              <a14:hiddenEffects xmlns:a14="http://schemas.microsoft.com/office/drawing/2010/main">
+              <a14:hiddenEffects xmlns="" xmlns:a14="http://schemas.microsoft.com/office/drawing/2010/main">
                 <a:effectLst>
                   <a:outerShdw dist="35921" dir="2700000" algn="ctr" rotWithShape="0">
                     <a:schemeClr val="bg2"/>
@@ -11516,14 +10021,14 @@
               <a:effectLst/>
               <a:extLst>
                 <a:ext uri="{909E8E84-426E-40DD-AFC4-6F175D3DCCD1}">
-                  <a14:hiddenFill xmlns:a14="http://schemas.microsoft.com/office/drawing/2010/main">
+                  <a14:hiddenFill xmlns="" xmlns:a14="http://schemas.microsoft.com/office/drawing/2010/main">
                     <a:solidFill>
                       <a:schemeClr val="accent1"/>
                     </a:solidFill>
                   </a14:hiddenFill>
                 </a:ext>
                 <a:ext uri="{AF507438-7753-43E0-B8FC-AC1667EBCBE1}">
-                  <a14:hiddenEffects xmlns:a14="http://schemas.microsoft.com/office/drawing/2010/main">
+                  <a14:hiddenEffects xmlns="" xmlns:a14="http://schemas.microsoft.com/office/drawing/2010/main">
                     <a:effectLst>
                       <a:outerShdw dist="35921" dir="2700000" algn="ctr" rotWithShape="0">
                         <a:schemeClr val="bg2"/>
@@ -11569,12 +10074,12 @@
               <a:effectLst/>
               <a:extLst>
                 <a:ext uri="{909E8E84-426E-40DD-AFC4-6F175D3DCCD1}">
-                  <a14:hiddenFill xmlns:a14="http://schemas.microsoft.com/office/drawing/2010/main">
+                  <a14:hiddenFill xmlns="" xmlns:a14="http://schemas.microsoft.com/office/drawing/2010/main">
                     <a:noFill/>
                   </a14:hiddenFill>
                 </a:ext>
                 <a:ext uri="{AF507438-7753-43E0-B8FC-AC1667EBCBE1}">
-                  <a14:hiddenEffects xmlns:a14="http://schemas.microsoft.com/office/drawing/2010/main">
+                  <a14:hiddenEffects xmlns="" xmlns:a14="http://schemas.microsoft.com/office/drawing/2010/main">
                     <a:effectLst>
                       <a:outerShdw dist="35921" dir="2700000" algn="ctr" rotWithShape="0">
                         <a:schemeClr val="bg2"/>
@@ -11616,14 +10121,14 @@
             <a:effectLst/>
             <a:extLst>
               <a:ext uri="{909E8E84-426E-40DD-AFC4-6F175D3DCCD1}">
-                <a14:hiddenFill xmlns:a14="http://schemas.microsoft.com/office/drawing/2010/main">
+                <a14:hiddenFill xmlns="" xmlns:a14="http://schemas.microsoft.com/office/drawing/2010/main">
                   <a:solidFill>
                     <a:schemeClr val="accent1"/>
                   </a:solidFill>
                 </a14:hiddenFill>
               </a:ext>
               <a:ext uri="{91240B29-F687-4F45-9708-019B960494DF}">
-                <a14:hiddenLine xmlns:a14="http://schemas.microsoft.com/office/drawing/2010/main" w="9525">
+                <a14:hiddenLine xmlns="" xmlns:a14="http://schemas.microsoft.com/office/drawing/2010/main" w="9525">
                   <a:solidFill>
                     <a:schemeClr val="tx1"/>
                   </a:solidFill>
@@ -11633,7 +10138,7 @@
                 </a14:hiddenLine>
               </a:ext>
               <a:ext uri="{AF507438-7753-43E0-B8FC-AC1667EBCBE1}">
-                <a14:hiddenEffects xmlns:a14="http://schemas.microsoft.com/office/drawing/2010/main">
+                <a14:hiddenEffects xmlns="" xmlns:a14="http://schemas.microsoft.com/office/drawing/2010/main">
                   <a:effectLst>
                     <a:outerShdw dist="35921" dir="2700000" algn="ctr" rotWithShape="0">
                       <a:schemeClr val="bg2"/>
@@ -11694,12 +10199,12 @@
           <a:effectLst/>
           <a:extLst>
             <a:ext uri="{909E8E84-426E-40DD-AFC4-6F175D3DCCD1}">
-              <a14:hiddenFill xmlns:a14="http://schemas.microsoft.com/office/drawing/2010/main">
+              <a14:hiddenFill xmlns="" xmlns:a14="http://schemas.microsoft.com/office/drawing/2010/main">
                 <a:noFill/>
               </a14:hiddenFill>
             </a:ext>
             <a:ext uri="{AF507438-7753-43E0-B8FC-AC1667EBCBE1}">
-              <a14:hiddenEffects xmlns:a14="http://schemas.microsoft.com/office/drawing/2010/main">
+              <a14:hiddenEffects xmlns="" xmlns:a14="http://schemas.microsoft.com/office/drawing/2010/main">
                 <a:effectLst>
                   <a:outerShdw dist="35921" dir="2700000" algn="ctr" rotWithShape="0">
                     <a:schemeClr val="bg2"/>
@@ -11733,14 +10238,14 @@
           <a:effectLst/>
           <a:extLst>
             <a:ext uri="{909E8E84-426E-40DD-AFC4-6F175D3DCCD1}">
-              <a14:hiddenFill xmlns:a14="http://schemas.microsoft.com/office/drawing/2010/main">
+              <a14:hiddenFill xmlns="" xmlns:a14="http://schemas.microsoft.com/office/drawing/2010/main">
                 <a:solidFill>
                   <a:schemeClr val="accent1"/>
                 </a:solidFill>
               </a14:hiddenFill>
             </a:ext>
             <a:ext uri="{91240B29-F687-4F45-9708-019B960494DF}">
-              <a14:hiddenLine xmlns:a14="http://schemas.microsoft.com/office/drawing/2010/main" w="9525">
+              <a14:hiddenLine xmlns="" xmlns:a14="http://schemas.microsoft.com/office/drawing/2010/main" w="9525">
                 <a:solidFill>
                   <a:schemeClr val="tx1"/>
                 </a:solidFill>
@@ -11750,7 +10255,7 @@
               </a14:hiddenLine>
             </a:ext>
             <a:ext uri="{AF507438-7753-43E0-B8FC-AC1667EBCBE1}">
-              <a14:hiddenEffects xmlns:a14="http://schemas.microsoft.com/office/drawing/2010/main">
+              <a14:hiddenEffects xmlns="" xmlns:a14="http://schemas.microsoft.com/office/drawing/2010/main">
                 <a:effectLst>
                   <a:outerShdw dist="35921" dir="2700000" algn="ctr" rotWithShape="0">
                     <a:schemeClr val="bg2"/>
@@ -11801,14 +10306,14 @@
           <a:effectLst/>
           <a:extLst>
             <a:ext uri="{909E8E84-426E-40DD-AFC4-6F175D3DCCD1}">
-              <a14:hiddenFill xmlns:a14="http://schemas.microsoft.com/office/drawing/2010/main">
+              <a14:hiddenFill xmlns="" xmlns:a14="http://schemas.microsoft.com/office/drawing/2010/main">
                 <a:solidFill>
                   <a:schemeClr val="accent1"/>
                 </a:solidFill>
               </a14:hiddenFill>
             </a:ext>
             <a:ext uri="{AF507438-7753-43E0-B8FC-AC1667EBCBE1}">
-              <a14:hiddenEffects xmlns:a14="http://schemas.microsoft.com/office/drawing/2010/main">
+              <a14:hiddenEffects xmlns="" xmlns:a14="http://schemas.microsoft.com/office/drawing/2010/main">
                 <a:effectLst>
                   <a:outerShdw dist="35921" dir="2700000" algn="ctr" rotWithShape="0">
                     <a:schemeClr val="bg2"/>
@@ -11873,14 +10378,14 @@
           <a:effectLst/>
           <a:extLst>
             <a:ext uri="{909E8E84-426E-40DD-AFC4-6F175D3DCCD1}">
-              <a14:hiddenFill xmlns:a14="http://schemas.microsoft.com/office/drawing/2010/main">
+              <a14:hiddenFill xmlns="" xmlns:a14="http://schemas.microsoft.com/office/drawing/2010/main">
                 <a:solidFill>
                   <a:schemeClr val="accent1"/>
                 </a:solidFill>
               </a14:hiddenFill>
             </a:ext>
             <a:ext uri="{AF507438-7753-43E0-B8FC-AC1667EBCBE1}">
-              <a14:hiddenEffects xmlns:a14="http://schemas.microsoft.com/office/drawing/2010/main">
+              <a14:hiddenEffects xmlns="" xmlns:a14="http://schemas.microsoft.com/office/drawing/2010/main">
                 <a:effectLst>
                   <a:outerShdw dist="35921" dir="2700000" algn="ctr" rotWithShape="0">
                     <a:schemeClr val="bg2"/>
@@ -11969,12 +10474,12 @@
           <a:effectLst/>
           <a:extLst>
             <a:ext uri="{909E8E84-426E-40DD-AFC4-6F175D3DCCD1}">
-              <a14:hiddenFill xmlns:a14="http://schemas.microsoft.com/office/drawing/2010/main">
+              <a14:hiddenFill xmlns="" xmlns:a14="http://schemas.microsoft.com/office/drawing/2010/main">
                 <a:noFill/>
               </a14:hiddenFill>
             </a:ext>
             <a:ext uri="{AF507438-7753-43E0-B8FC-AC1667EBCBE1}">
-              <a14:hiddenEffects xmlns:a14="http://schemas.microsoft.com/office/drawing/2010/main">
+              <a14:hiddenEffects xmlns="" xmlns:a14="http://schemas.microsoft.com/office/drawing/2010/main">
                 <a:effectLst>
                   <a:outerShdw dist="35921" dir="2700000" algn="ctr" rotWithShape="0">
                     <a:schemeClr val="bg2"/>
@@ -12008,14 +10513,14 @@
           <a:effectLst/>
           <a:extLst>
             <a:ext uri="{909E8E84-426E-40DD-AFC4-6F175D3DCCD1}">
-              <a14:hiddenFill xmlns:a14="http://schemas.microsoft.com/office/drawing/2010/main">
+              <a14:hiddenFill xmlns="" xmlns:a14="http://schemas.microsoft.com/office/drawing/2010/main">
                 <a:solidFill>
                   <a:schemeClr val="accent1"/>
                 </a:solidFill>
               </a14:hiddenFill>
             </a:ext>
             <a:ext uri="{91240B29-F687-4F45-9708-019B960494DF}">
-              <a14:hiddenLine xmlns:a14="http://schemas.microsoft.com/office/drawing/2010/main" w="9525">
+              <a14:hiddenLine xmlns="" xmlns:a14="http://schemas.microsoft.com/office/drawing/2010/main" w="9525">
                 <a:solidFill>
                   <a:schemeClr val="tx1"/>
                 </a:solidFill>
@@ -12025,7 +10530,7 @@
               </a14:hiddenLine>
             </a:ext>
             <a:ext uri="{AF507438-7753-43E0-B8FC-AC1667EBCBE1}">
-              <a14:hiddenEffects xmlns:a14="http://schemas.microsoft.com/office/drawing/2010/main">
+              <a14:hiddenEffects xmlns="" xmlns:a14="http://schemas.microsoft.com/office/drawing/2010/main">
                 <a:effectLst>
                   <a:outerShdw dist="35921" dir="2700000" algn="ctr" rotWithShape="0">
                     <a:schemeClr val="bg2"/>
@@ -12081,12 +10586,12 @@
           <a:effectLst/>
           <a:extLst>
             <a:ext uri="{909E8E84-426E-40DD-AFC4-6F175D3DCCD1}">
-              <a14:hiddenFill xmlns:a14="http://schemas.microsoft.com/office/drawing/2010/main">
+              <a14:hiddenFill xmlns="" xmlns:a14="http://schemas.microsoft.com/office/drawing/2010/main">
                 <a:noFill/>
               </a14:hiddenFill>
             </a:ext>
             <a:ext uri="{AF507438-7753-43E0-B8FC-AC1667EBCBE1}">
-              <a14:hiddenEffects xmlns:a14="http://schemas.microsoft.com/office/drawing/2010/main">
+              <a14:hiddenEffects xmlns="" xmlns:a14="http://schemas.microsoft.com/office/drawing/2010/main">
                 <a:effectLst>
                   <a:outerShdw dist="35921" dir="2700000" algn="ctr" rotWithShape="0">
                     <a:schemeClr val="bg2"/>
@@ -12120,14 +10625,14 @@
           <a:effectLst/>
           <a:extLst>
             <a:ext uri="{909E8E84-426E-40DD-AFC4-6F175D3DCCD1}">
-              <a14:hiddenFill xmlns:a14="http://schemas.microsoft.com/office/drawing/2010/main">
+              <a14:hiddenFill xmlns="" xmlns:a14="http://schemas.microsoft.com/office/drawing/2010/main">
                 <a:solidFill>
                   <a:schemeClr val="accent1"/>
                 </a:solidFill>
               </a14:hiddenFill>
             </a:ext>
             <a:ext uri="{91240B29-F687-4F45-9708-019B960494DF}">
-              <a14:hiddenLine xmlns:a14="http://schemas.microsoft.com/office/drawing/2010/main" w="9525">
+              <a14:hiddenLine xmlns="" xmlns:a14="http://schemas.microsoft.com/office/drawing/2010/main" w="9525">
                 <a:solidFill>
                   <a:schemeClr val="tx1"/>
                 </a:solidFill>
@@ -12137,7 +10642,7 @@
               </a14:hiddenLine>
             </a:ext>
             <a:ext uri="{AF507438-7753-43E0-B8FC-AC1667EBCBE1}">
-              <a14:hiddenEffects xmlns:a14="http://schemas.microsoft.com/office/drawing/2010/main">
+              <a14:hiddenEffects xmlns="" xmlns:a14="http://schemas.microsoft.com/office/drawing/2010/main">
                 <a:effectLst>
                   <a:outerShdw dist="35921" dir="2700000" algn="ctr" rotWithShape="0">
                     <a:schemeClr val="bg2"/>
@@ -12190,12 +10695,12 @@
           <a:effectLst/>
           <a:extLst>
             <a:ext uri="{909E8E84-426E-40DD-AFC4-6F175D3DCCD1}">
-              <a14:hiddenFill xmlns:a14="http://schemas.microsoft.com/office/drawing/2010/main">
+              <a14:hiddenFill xmlns="" xmlns:a14="http://schemas.microsoft.com/office/drawing/2010/main">
                 <a:noFill/>
               </a14:hiddenFill>
             </a:ext>
             <a:ext uri="{AF507438-7753-43E0-B8FC-AC1667EBCBE1}">
-              <a14:hiddenEffects xmlns:a14="http://schemas.microsoft.com/office/drawing/2010/main">
+              <a14:hiddenEffects xmlns="" xmlns:a14="http://schemas.microsoft.com/office/drawing/2010/main">
                 <a:effectLst>
                   <a:outerShdw dist="35921" dir="2700000" algn="ctr" rotWithShape="0">
                     <a:schemeClr val="bg2"/>
@@ -12229,14 +10734,14 @@
           <a:effectLst/>
           <a:extLst>
             <a:ext uri="{909E8E84-426E-40DD-AFC4-6F175D3DCCD1}">
-              <a14:hiddenFill xmlns:a14="http://schemas.microsoft.com/office/drawing/2010/main">
+              <a14:hiddenFill xmlns="" xmlns:a14="http://schemas.microsoft.com/office/drawing/2010/main">
                 <a:solidFill>
                   <a:schemeClr val="accent1"/>
                 </a:solidFill>
               </a14:hiddenFill>
             </a:ext>
             <a:ext uri="{91240B29-F687-4F45-9708-019B960494DF}">
-              <a14:hiddenLine xmlns:a14="http://schemas.microsoft.com/office/drawing/2010/main" w="9525">
+              <a14:hiddenLine xmlns="" xmlns:a14="http://schemas.microsoft.com/office/drawing/2010/main" w="9525">
                 <a:solidFill>
                   <a:schemeClr val="tx1"/>
                 </a:solidFill>
@@ -12246,7 +10751,7 @@
               </a14:hiddenLine>
             </a:ext>
             <a:ext uri="{AF507438-7753-43E0-B8FC-AC1667EBCBE1}">
-              <a14:hiddenEffects xmlns:a14="http://schemas.microsoft.com/office/drawing/2010/main">
+              <a14:hiddenEffects xmlns="" xmlns:a14="http://schemas.microsoft.com/office/drawing/2010/main">
                 <a:effectLst>
                   <a:outerShdw dist="35921" dir="2700000" algn="ctr" rotWithShape="0">
                     <a:schemeClr val="bg2"/>
@@ -12297,14 +10802,14 @@
           <a:effectLst/>
           <a:extLst>
             <a:ext uri="{909E8E84-426E-40DD-AFC4-6F175D3DCCD1}">
-              <a14:hiddenFill xmlns:a14="http://schemas.microsoft.com/office/drawing/2010/main">
+              <a14:hiddenFill xmlns="" xmlns:a14="http://schemas.microsoft.com/office/drawing/2010/main">
                 <a:solidFill>
                   <a:schemeClr val="accent1"/>
                 </a:solidFill>
               </a14:hiddenFill>
             </a:ext>
             <a:ext uri="{AF507438-7753-43E0-B8FC-AC1667EBCBE1}">
-              <a14:hiddenEffects xmlns:a14="http://schemas.microsoft.com/office/drawing/2010/main">
+              <a14:hiddenEffects xmlns="" xmlns:a14="http://schemas.microsoft.com/office/drawing/2010/main">
                 <a:effectLst>
                   <a:outerShdw dist="35921" dir="2700000" algn="ctr" rotWithShape="0">
                     <a:schemeClr val="bg2"/>
@@ -12373,12 +10878,12 @@
           <a:effectLst/>
           <a:extLst>
             <a:ext uri="{909E8E84-426E-40DD-AFC4-6F175D3DCCD1}">
-              <a14:hiddenFill xmlns:a14="http://schemas.microsoft.com/office/drawing/2010/main">
+              <a14:hiddenFill xmlns="" xmlns:a14="http://schemas.microsoft.com/office/drawing/2010/main">
                 <a:noFill/>
               </a14:hiddenFill>
             </a:ext>
             <a:ext uri="{AF507438-7753-43E0-B8FC-AC1667EBCBE1}">
-              <a14:hiddenEffects xmlns:a14="http://schemas.microsoft.com/office/drawing/2010/main">
+              <a14:hiddenEffects xmlns="" xmlns:a14="http://schemas.microsoft.com/office/drawing/2010/main">
                 <a:effectLst>
                   <a:outerShdw dist="35921" dir="2700000" algn="ctr" rotWithShape="0">
                     <a:schemeClr val="bg2"/>
@@ -12421,12 +10926,12 @@
           <a:effectLst/>
           <a:extLst>
             <a:ext uri="{909E8E84-426E-40DD-AFC4-6F175D3DCCD1}">
-              <a14:hiddenFill xmlns:a14="http://schemas.microsoft.com/office/drawing/2010/main">
+              <a14:hiddenFill xmlns="" xmlns:a14="http://schemas.microsoft.com/office/drawing/2010/main">
                 <a:noFill/>
               </a14:hiddenFill>
             </a:ext>
             <a:ext uri="{AF507438-7753-43E0-B8FC-AC1667EBCBE1}">
-              <a14:hiddenEffects xmlns:a14="http://schemas.microsoft.com/office/drawing/2010/main">
+              <a14:hiddenEffects xmlns="" xmlns:a14="http://schemas.microsoft.com/office/drawing/2010/main">
                 <a:effectLst>
                   <a:outerShdw dist="35921" dir="2700000" algn="ctr" rotWithShape="0">
                     <a:schemeClr val="bg2"/>
@@ -12460,14 +10965,14 @@
           <a:effectLst/>
           <a:extLst>
             <a:ext uri="{909E8E84-426E-40DD-AFC4-6F175D3DCCD1}">
-              <a14:hiddenFill xmlns:a14="http://schemas.microsoft.com/office/drawing/2010/main">
+              <a14:hiddenFill xmlns="" xmlns:a14="http://schemas.microsoft.com/office/drawing/2010/main">
                 <a:solidFill>
                   <a:schemeClr val="accent1"/>
                 </a:solidFill>
               </a14:hiddenFill>
             </a:ext>
             <a:ext uri="{91240B29-F687-4F45-9708-019B960494DF}">
-              <a14:hiddenLine xmlns:a14="http://schemas.microsoft.com/office/drawing/2010/main" w="9525">
+              <a14:hiddenLine xmlns="" xmlns:a14="http://schemas.microsoft.com/office/drawing/2010/main" w="9525">
                 <a:solidFill>
                   <a:schemeClr val="tx1"/>
                 </a:solidFill>
@@ -12477,7 +10982,7 @@
               </a14:hiddenLine>
             </a:ext>
             <a:ext uri="{AF507438-7753-43E0-B8FC-AC1667EBCBE1}">
-              <a14:hiddenEffects xmlns:a14="http://schemas.microsoft.com/office/drawing/2010/main">
+              <a14:hiddenEffects xmlns="" xmlns:a14="http://schemas.microsoft.com/office/drawing/2010/main">
                 <a:effectLst>
                   <a:outerShdw dist="35921" dir="2700000" algn="ctr" rotWithShape="0">
                     <a:schemeClr val="bg2"/>
@@ -12523,14 +11028,14 @@
           <a:effectLst/>
           <a:extLst>
             <a:ext uri="{909E8E84-426E-40DD-AFC4-6F175D3DCCD1}">
-              <a14:hiddenFill xmlns:a14="http://schemas.microsoft.com/office/drawing/2010/main">
+              <a14:hiddenFill xmlns="" xmlns:a14="http://schemas.microsoft.com/office/drawing/2010/main">
                 <a:solidFill>
                   <a:schemeClr val="accent1"/>
                 </a:solidFill>
               </a14:hiddenFill>
             </a:ext>
             <a:ext uri="{91240B29-F687-4F45-9708-019B960494DF}">
-              <a14:hiddenLine xmlns:a14="http://schemas.microsoft.com/office/drawing/2010/main" w="9525">
+              <a14:hiddenLine xmlns="" xmlns:a14="http://schemas.microsoft.com/office/drawing/2010/main" w="9525">
                 <a:solidFill>
                   <a:schemeClr val="tx1"/>
                 </a:solidFill>
@@ -12540,7 +11045,7 @@
               </a14:hiddenLine>
             </a:ext>
             <a:ext uri="{AF507438-7753-43E0-B8FC-AC1667EBCBE1}">
-              <a14:hiddenEffects xmlns:a14="http://schemas.microsoft.com/office/drawing/2010/main">
+              <a14:hiddenEffects xmlns="" xmlns:a14="http://schemas.microsoft.com/office/drawing/2010/main">
                 <a:effectLst>
                   <a:outerShdw dist="35921" dir="2700000" algn="ctr" rotWithShape="0">
                     <a:schemeClr val="bg2"/>
@@ -12593,12 +11098,12 @@
           <a:effectLst/>
           <a:extLst>
             <a:ext uri="{909E8E84-426E-40DD-AFC4-6F175D3DCCD1}">
-              <a14:hiddenFill xmlns:a14="http://schemas.microsoft.com/office/drawing/2010/main">
+              <a14:hiddenFill xmlns="" xmlns:a14="http://schemas.microsoft.com/office/drawing/2010/main">
                 <a:noFill/>
               </a14:hiddenFill>
             </a:ext>
             <a:ext uri="{AF507438-7753-43E0-B8FC-AC1667EBCBE1}">
-              <a14:hiddenEffects xmlns:a14="http://schemas.microsoft.com/office/drawing/2010/main">
+              <a14:hiddenEffects xmlns="" xmlns:a14="http://schemas.microsoft.com/office/drawing/2010/main">
                 <a:effectLst>
                   <a:outerShdw dist="35921" dir="2700000" algn="ctr" rotWithShape="0">
                     <a:schemeClr val="bg2"/>
@@ -12632,14 +11137,14 @@
           <a:effectLst/>
           <a:extLst>
             <a:ext uri="{909E8E84-426E-40DD-AFC4-6F175D3DCCD1}">
-              <a14:hiddenFill xmlns:a14="http://schemas.microsoft.com/office/drawing/2010/main">
+              <a14:hiddenFill xmlns="" xmlns:a14="http://schemas.microsoft.com/office/drawing/2010/main">
                 <a:solidFill>
                   <a:schemeClr val="accent1"/>
                 </a:solidFill>
               </a14:hiddenFill>
             </a:ext>
             <a:ext uri="{91240B29-F687-4F45-9708-019B960494DF}">
-              <a14:hiddenLine xmlns:a14="http://schemas.microsoft.com/office/drawing/2010/main" w="9525">
+              <a14:hiddenLine xmlns="" xmlns:a14="http://schemas.microsoft.com/office/drawing/2010/main" w="9525">
                 <a:solidFill>
                   <a:schemeClr val="tx1"/>
                 </a:solidFill>
@@ -12649,7 +11154,7 @@
               </a14:hiddenLine>
             </a:ext>
             <a:ext uri="{AF507438-7753-43E0-B8FC-AC1667EBCBE1}">
-              <a14:hiddenEffects xmlns:a14="http://schemas.microsoft.com/office/drawing/2010/main">
+              <a14:hiddenEffects xmlns="" xmlns:a14="http://schemas.microsoft.com/office/drawing/2010/main">
                 <a:effectLst>
                   <a:outerShdw dist="35921" dir="2700000" algn="ctr" rotWithShape="0">
                     <a:schemeClr val="bg2"/>
@@ -12675,7 +11180,7 @@
     </p:spTree>
     <p:extLst>
       <p:ext uri="{BB962C8B-B14F-4D97-AF65-F5344CB8AC3E}">
-        <p14:creationId xmlns:p14="http://schemas.microsoft.com/office/powerpoint/2010/main" val="3005709924"/>
+        <p14:creationId xmlns="" xmlns:p14="http://schemas.microsoft.com/office/powerpoint/2010/main" val="3005709924"/>
       </p:ext>
     </p:extLst>
   </p:cSld>

</xml_diff>